<commit_message>
Shorten slides and snippets even further.
</commit_message>
<xml_diff>
--- a/docs/OfflineDebugging/A Dinosaur and a Python 04.pptx
+++ b/docs/OfflineDebugging/A Dinosaur and a Python 04.pptx
@@ -5,7 +5,7 @@
     <p:sldMasterId id="2147483648" r:id="rId1"/>
   </p:sldMasterIdLst>
   <p:notesMasterIdLst>
-    <p:notesMasterId r:id="rId39"/>
+    <p:notesMasterId r:id="rId38"/>
   </p:notesMasterIdLst>
   <p:sldIdLst>
     <p:sldId id="256" r:id="rId2"/>
@@ -22,29 +22,28 @@
     <p:sldId id="317" r:id="rId13"/>
     <p:sldId id="318" r:id="rId14"/>
     <p:sldId id="319" r:id="rId15"/>
-    <p:sldId id="272" r:id="rId16"/>
-    <p:sldId id="302" r:id="rId17"/>
-    <p:sldId id="274" r:id="rId18"/>
-    <p:sldId id="301" r:id="rId19"/>
-    <p:sldId id="275" r:id="rId20"/>
-    <p:sldId id="277" r:id="rId21"/>
-    <p:sldId id="321" r:id="rId22"/>
-    <p:sldId id="332" r:id="rId23"/>
-    <p:sldId id="322" r:id="rId24"/>
-    <p:sldId id="330" r:id="rId25"/>
-    <p:sldId id="324" r:id="rId26"/>
-    <p:sldId id="333" r:id="rId27"/>
-    <p:sldId id="334" r:id="rId28"/>
-    <p:sldId id="291" r:id="rId29"/>
-    <p:sldId id="331" r:id="rId30"/>
-    <p:sldId id="286" r:id="rId31"/>
-    <p:sldId id="335" r:id="rId32"/>
-    <p:sldId id="279" r:id="rId33"/>
-    <p:sldId id="336" r:id="rId34"/>
-    <p:sldId id="276" r:id="rId35"/>
-    <p:sldId id="260" r:id="rId36"/>
-    <p:sldId id="298" r:id="rId37"/>
-    <p:sldId id="263" r:id="rId38"/>
+    <p:sldId id="302" r:id="rId16"/>
+    <p:sldId id="274" r:id="rId17"/>
+    <p:sldId id="301" r:id="rId18"/>
+    <p:sldId id="275" r:id="rId19"/>
+    <p:sldId id="277" r:id="rId20"/>
+    <p:sldId id="321" r:id="rId21"/>
+    <p:sldId id="332" r:id="rId22"/>
+    <p:sldId id="322" r:id="rId23"/>
+    <p:sldId id="330" r:id="rId24"/>
+    <p:sldId id="324" r:id="rId25"/>
+    <p:sldId id="333" r:id="rId26"/>
+    <p:sldId id="334" r:id="rId27"/>
+    <p:sldId id="291" r:id="rId28"/>
+    <p:sldId id="331" r:id="rId29"/>
+    <p:sldId id="286" r:id="rId30"/>
+    <p:sldId id="335" r:id="rId31"/>
+    <p:sldId id="279" r:id="rId32"/>
+    <p:sldId id="336" r:id="rId33"/>
+    <p:sldId id="276" r:id="rId34"/>
+    <p:sldId id="260" r:id="rId35"/>
+    <p:sldId id="298" r:id="rId36"/>
+    <p:sldId id="263" r:id="rId37"/>
   </p:sldIdLst>
   <p:sldSz cx="9144000" cy="6858000" type="screen4x3"/>
   <p:notesSz cx="6858000" cy="9144000"/>
@@ -244,7 +243,7 @@
           <a:p>
             <a:fld id="{34DABC08-5500-4080-81A3-D11EBECCC5B6}" type="datetimeFigureOut">
               <a:rPr lang="en-US" smtClean="0"/>
-              <a:t>2021-02-14</a:t>
+              <a:t>2021-02-15</a:t>
             </a:fld>
             <a:endParaRPr lang="en-US"/>
           </a:p>
@@ -650,7 +649,7 @@
             <a:spLocks noGrp="1"/>
           </p:cNvSpPr>
           <p:nvPr>
-            <p:ph type="sldNum" sz="quarter" idx="5"/>
+            <p:ph type="sldNum" sz="quarter" idx="10"/>
           </p:nvPr>
         </p:nvSpPr>
         <p:spPr/>
@@ -660,7 +659,7 @@
           <a:p>
             <a:fld id="{E3C747D4-569D-4A36-9900-76CDCE968818}" type="slidenum">
               <a:rPr lang="en-US" smtClean="0"/>
-              <a:t>15</a:t>
+              <a:t>19</a:t>
             </a:fld>
             <a:endParaRPr lang="en-US"/>
           </a:p>
@@ -669,7 +668,7 @@
     </p:spTree>
     <p:extLst>
       <p:ext uri="{BB962C8B-B14F-4D97-AF65-F5344CB8AC3E}">
-        <p14:creationId xmlns:p14="http://schemas.microsoft.com/office/powerpoint/2010/main" val="2676901173"/>
+        <p14:creationId xmlns:p14="http://schemas.microsoft.com/office/powerpoint/2010/main" val="2824208565"/>
       </p:ext>
     </p:extLst>
   </p:cSld>
@@ -744,7 +743,7 @@
           <a:p>
             <a:fld id="{E3C747D4-569D-4A36-9900-76CDCE968818}" type="slidenum">
               <a:rPr lang="en-US" smtClean="0"/>
-              <a:t>20</a:t>
+              <a:t>28</a:t>
             </a:fld>
             <a:endParaRPr lang="en-US"/>
           </a:p>
@@ -753,7 +752,7 @@
     </p:spTree>
     <p:extLst>
       <p:ext uri="{BB962C8B-B14F-4D97-AF65-F5344CB8AC3E}">
-        <p14:creationId xmlns:p14="http://schemas.microsoft.com/office/powerpoint/2010/main" val="2824208565"/>
+        <p14:creationId xmlns:p14="http://schemas.microsoft.com/office/powerpoint/2010/main" val="2081727689"/>
       </p:ext>
     </p:extLst>
   </p:cSld>
@@ -828,91 +827,7 @@
           <a:p>
             <a:fld id="{E3C747D4-569D-4A36-9900-76CDCE968818}" type="slidenum">
               <a:rPr lang="en-US" smtClean="0"/>
-              <a:t>29</a:t>
-            </a:fld>
-            <a:endParaRPr lang="en-US"/>
-          </a:p>
-        </p:txBody>
-      </p:sp>
-    </p:spTree>
-    <p:extLst>
-      <p:ext uri="{BB962C8B-B14F-4D97-AF65-F5344CB8AC3E}">
-        <p14:creationId xmlns:p14="http://schemas.microsoft.com/office/powerpoint/2010/main" val="2081727689"/>
-      </p:ext>
-    </p:extLst>
-  </p:cSld>
-  <p:clrMapOvr>
-    <a:masterClrMapping/>
-  </p:clrMapOvr>
-</p:notes>
-</file>
-
-<file path=ppt/notesSlides/notesSlide5.xml><?xml version="1.0" encoding="utf-8"?>
-<p:notes xmlns:a="http://schemas.openxmlformats.org/drawingml/2006/main" xmlns:r="http://schemas.openxmlformats.org/officeDocument/2006/relationships" xmlns:p="http://schemas.openxmlformats.org/presentationml/2006/main">
-  <p:cSld>
-    <p:spTree>
-      <p:nvGrpSpPr>
-        <p:cNvPr id="1" name=""/>
-        <p:cNvGrpSpPr/>
-        <p:nvPr/>
-      </p:nvGrpSpPr>
-      <p:grpSpPr>
-        <a:xfrm>
-          <a:off x="0" y="0"/>
-          <a:ext cx="0" cy="0"/>
-          <a:chOff x="0" y="0"/>
-          <a:chExt cx="0" cy="0"/>
-        </a:xfrm>
-      </p:grpSpPr>
-      <p:sp>
-        <p:nvSpPr>
-          <p:cNvPr id="2" name="Slide Image Placeholder 1"/>
-          <p:cNvSpPr>
-            <a:spLocks noGrp="1" noRot="1" noChangeAspect="1"/>
-          </p:cNvSpPr>
-          <p:nvPr>
-            <p:ph type="sldImg"/>
-          </p:nvPr>
-        </p:nvSpPr>
-        <p:spPr/>
-      </p:sp>
-      <p:sp>
-        <p:nvSpPr>
-          <p:cNvPr id="3" name="Notes Placeholder 2"/>
-          <p:cNvSpPr>
-            <a:spLocks noGrp="1"/>
-          </p:cNvSpPr>
-          <p:nvPr>
-            <p:ph type="body" idx="1"/>
-          </p:nvPr>
-        </p:nvSpPr>
-        <p:spPr/>
-        <p:txBody>
-          <a:bodyPr/>
-          <a:lstStyle/>
-          <a:p>
-            <a:endParaRPr lang="en-US" dirty="0"/>
-          </a:p>
-        </p:txBody>
-      </p:sp>
-      <p:sp>
-        <p:nvSpPr>
-          <p:cNvPr id="4" name="Slide Number Placeholder 3"/>
-          <p:cNvSpPr>
-            <a:spLocks noGrp="1"/>
-          </p:cNvSpPr>
-          <p:nvPr>
-            <p:ph type="sldNum" sz="quarter" idx="10"/>
-          </p:nvPr>
-        </p:nvSpPr>
-        <p:spPr/>
-        <p:txBody>
-          <a:bodyPr/>
-          <a:lstStyle/>
-          <a:p>
-            <a:fld id="{E3C747D4-569D-4A36-9900-76CDCE968818}" type="slidenum">
-              <a:rPr lang="en-US" smtClean="0"/>
-              <a:t>33</a:t>
+              <a:t>32</a:t>
             </a:fld>
             <a:endParaRPr lang="en-US"/>
           </a:p>
@@ -5220,181 +5135,69 @@
         </p:nvSpPr>
         <p:spPr/>
         <p:txBody>
-          <a:bodyPr>
-            <a:normAutofit/>
-          </a:bodyPr>
-          <a:lstStyle/>
-          <a:p>
-            <a:r>
-              <a:rPr lang="en-US" sz="4400" kern="1200" dirty="0">
-                <a:solidFill>
-                  <a:schemeClr val="tx1"/>
-                </a:solidFill>
+          <a:bodyPr/>
+          <a:lstStyle/>
+          <a:p>
+            <a:r>
+              <a:rPr lang="en-US" dirty="0"/>
+              <a:t>Timestamp</a:t>
+            </a:r>
+          </a:p>
+        </p:txBody>
+      </p:sp>
+      <p:sp>
+        <p:nvSpPr>
+          <p:cNvPr id="3" name="Content Placeholder 2"/>
+          <p:cNvSpPr>
+            <a:spLocks noGrp="1"/>
+          </p:cNvSpPr>
+          <p:nvPr>
+            <p:ph idx="1"/>
+          </p:nvPr>
+        </p:nvSpPr>
+        <p:spPr/>
+        <p:txBody>
+          <a:bodyPr/>
+          <a:lstStyle/>
+          <a:p>
+            <a:r>
+              <a:rPr lang="en-US" dirty="0">
                 <a:effectLst/>
-                <a:latin typeface="+mj-lt"/>
-                <a:ea typeface="+mj-ea"/>
-                <a:cs typeface="+mj-cs"/>
-              </a:rPr>
-              <a:t>Currently</a:t>
-            </a:r>
-            <a:r>
-              <a:rPr lang="en-US" sz="4400" kern="1200" baseline="0" dirty="0">
-                <a:solidFill>
-                  <a:schemeClr val="tx1"/>
-                </a:solidFill>
-                <a:effectLst/>
-                <a:latin typeface="+mj-lt"/>
-                <a:ea typeface="+mj-ea"/>
-                <a:cs typeface="+mj-cs"/>
-              </a:rPr>
-              <a:t> </a:t>
-            </a:r>
-            <a:r>
-              <a:rPr lang="en-US" sz="4400" kern="1200" dirty="0">
-                <a:solidFill>
-                  <a:schemeClr val="tx1"/>
-                </a:solidFill>
-                <a:effectLst/>
-                <a:latin typeface="+mj-lt"/>
-                <a:ea typeface="+mj-ea"/>
-                <a:cs typeface="+mj-cs"/>
-              </a:rPr>
-              <a:t>Try to Meet</a:t>
-            </a:r>
+              </a:rPr>
+              <a:t>Date and time, to second or millisecond</a:t>
+            </a:r>
+          </a:p>
+          <a:p>
             <a:endParaRPr lang="en-US" dirty="0"/>
           </a:p>
-        </p:txBody>
-      </p:sp>
-      <p:sp>
-        <p:nvSpPr>
-          <p:cNvPr id="3" name="Content Placeholder 2"/>
-          <p:cNvSpPr>
-            <a:spLocks noGrp="1"/>
-          </p:cNvSpPr>
-          <p:nvPr>
-            <p:ph idx="1"/>
-          </p:nvPr>
-        </p:nvSpPr>
-        <p:spPr>
-          <a:xfrm>
-            <a:off x="457200" y="1447800"/>
-            <a:ext cx="8305800" cy="4800600"/>
-          </a:xfrm>
-        </p:spPr>
-        <p:txBody>
-          <a:bodyPr>
-            <a:normAutofit/>
-          </a:bodyPr>
-          <a:lstStyle/>
-          <a:p>
-            <a:pPr lvl="0"/>
-            <a:r>
-              <a:rPr lang="en-US" sz="3200" kern="1200" dirty="0">
-                <a:solidFill>
-                  <a:schemeClr val="tx1"/>
-                </a:solidFill>
-                <a:effectLst/>
-                <a:latin typeface="+mn-lt"/>
-                <a:ea typeface="+mn-ea"/>
-                <a:cs typeface="+mn-cs"/>
-              </a:rPr>
-              <a:t>Standard, compact format</a:t>
-            </a:r>
-          </a:p>
-          <a:p>
-            <a:pPr lvl="0"/>
-            <a:r>
-              <a:rPr lang="en-US" sz="3200" kern="1200" dirty="0">
-                <a:solidFill>
-                  <a:schemeClr val="tx1"/>
-                </a:solidFill>
-                <a:effectLst/>
-                <a:latin typeface="+mn-lt"/>
-                <a:ea typeface="+mn-ea"/>
-                <a:cs typeface="+mn-cs"/>
-              </a:rPr>
-              <a:t>Function enter/exit or anywhere</a:t>
-            </a:r>
-          </a:p>
           <a:p>
             <a:r>
               <a:rPr lang="en-US" dirty="0"/>
-              <a:t>Output location and format</a:t>
-            </a:r>
-          </a:p>
-          <a:p>
-            <a:pPr lvl="0"/>
-            <a:r>
-              <a:rPr lang="en-US" sz="3200" kern="1200" dirty="0">
-                <a:solidFill>
-                  <a:schemeClr val="tx1"/>
-                </a:solidFill>
-                <a:effectLst/>
-                <a:latin typeface="+mn-lt"/>
-                <a:ea typeface="+mn-ea"/>
-                <a:cs typeface="+mn-cs"/>
-              </a:rPr>
-              <a:t>Filter by importance, source</a:t>
-            </a:r>
-          </a:p>
-          <a:p>
-            <a:r>
-              <a:rPr lang="en-US" dirty="0"/>
-              <a:t>Low performance impact</a:t>
-            </a:r>
-          </a:p>
-          <a:p>
-            <a:pPr marL="0" indent="0" rtl="0" eaLnBrk="1" latinLnBrk="0" hangingPunct="1">
-              <a:buNone/>
-            </a:pPr>
-            <a:r>
-              <a:rPr lang="en-US" sz="3200" b="0" kern="1200" dirty="0">
-                <a:solidFill>
-                  <a:schemeClr val="tx1"/>
-                </a:solidFill>
-                <a:effectLst/>
-                <a:latin typeface="+mn-lt"/>
-                <a:ea typeface="+mn-ea"/>
-                <a:cs typeface="+mn-cs"/>
-              </a:rPr>
-              <a:t>and</a:t>
-            </a:r>
+              <a:t>(All examples</a:t>
+            </a:r>
+            <a:r>
+              <a:rPr lang="en-US" baseline="0" dirty="0"/>
+              <a:t> from real code, real output)</a:t>
+            </a:r>
+            <a:endParaRPr lang="en-US" dirty="0"/>
+          </a:p>
+          <a:p>
+            <a:endParaRPr lang="en-US" dirty="0"/>
+          </a:p>
+          <a:p>
+            <a:r>
+              <a:rPr lang="en-US" sz="2400" b="1" dirty="0">
+                <a:solidFill>
+                  <a:srgbClr val="00B050"/>
+                </a:solidFill>
+              </a:rPr>
+              <a:t>&lt;code: timestamp&gt;</a:t>
+            </a:r>
+          </a:p>
+          <a:p>
             <a:endParaRPr lang="en-US" dirty="0">
               <a:effectLst/>
             </a:endParaRPr>
-          </a:p>
-          <a:p>
-            <a:pPr rtl="0" eaLnBrk="1" latinLnBrk="0" hangingPunct="1"/>
-            <a:r>
-              <a:rPr lang="en-US" sz="3200" b="1" kern="1200" dirty="0">
-                <a:solidFill>
-                  <a:schemeClr val="tx1"/>
-                </a:solidFill>
-                <a:effectLst/>
-                <a:latin typeface="+mn-lt"/>
-                <a:ea typeface="+mn-ea"/>
-                <a:cs typeface="+mn-cs"/>
-              </a:rPr>
-              <a:t>Manageable</a:t>
-            </a:r>
-            <a:r>
-              <a:rPr lang="en-US" sz="3200" b="1" kern="1200" baseline="0" dirty="0">
-                <a:solidFill>
-                  <a:schemeClr val="tx1"/>
-                </a:solidFill>
-                <a:effectLst/>
-                <a:latin typeface="+mn-lt"/>
-                <a:ea typeface="+mn-ea"/>
-                <a:cs typeface="+mn-cs"/>
-              </a:rPr>
-              <a:t> without editing code!</a:t>
-            </a:r>
-            <a:endParaRPr lang="en-US" dirty="0">
-              <a:effectLst/>
-            </a:endParaRPr>
-          </a:p>
-          <a:p>
-            <a:endParaRPr lang="en-US" dirty="0"/>
           </a:p>
         </p:txBody>
       </p:sp>
@@ -5469,7 +5272,7 @@
     </p:spTree>
     <p:extLst>
       <p:ext uri="{BB962C8B-B14F-4D97-AF65-F5344CB8AC3E}">
-        <p14:creationId xmlns:p14="http://schemas.microsoft.com/office/powerpoint/2010/main" val="2684274098"/>
+        <p14:creationId xmlns:p14="http://schemas.microsoft.com/office/powerpoint/2010/main" val="927184767"/>
       </p:ext>
     </p:extLst>
   </p:cSld>
@@ -5513,8 +5316,13 @@
           <a:p>
             <a:r>
               <a:rPr lang="en-US" dirty="0"/>
-              <a:t>Timestamp</a:t>
-            </a:r>
+              <a:t>Easy Control</a:t>
+            </a:r>
+            <a:r>
+              <a:rPr lang="en-US" baseline="0" dirty="0"/>
+              <a:t> of Debug On/Off</a:t>
+            </a:r>
+            <a:endParaRPr lang="en-US" dirty="0"/>
           </a:p>
         </p:txBody>
       </p:sp>
@@ -5530,47 +5338,150 @@
         </p:nvSpPr>
         <p:spPr/>
         <p:txBody>
-          <a:bodyPr/>
-          <a:lstStyle/>
-          <a:p>
-            <a:r>
-              <a:rPr lang="en-US" dirty="0">
+          <a:bodyPr>
+            <a:normAutofit/>
+          </a:bodyPr>
+          <a:lstStyle/>
+          <a:p>
+            <a:pPr lvl="0"/>
+            <a:r>
+              <a:rPr lang="en-US" sz="3200" kern="1200" dirty="0">
+                <a:solidFill>
+                  <a:schemeClr val="tx1"/>
+                </a:solidFill>
                 <a:effectLst/>
-              </a:rPr>
-              <a:t>Date and time, to second or millisecond</a:t>
-            </a:r>
-          </a:p>
-          <a:p>
-            <a:endParaRPr lang="en-US" dirty="0"/>
-          </a:p>
-          <a:p>
-            <a:r>
-              <a:rPr lang="en-US" dirty="0"/>
-              <a:t>(All examples</a:t>
-            </a:r>
-            <a:r>
-              <a:rPr lang="en-US" baseline="0" dirty="0"/>
-              <a:t> from real code, real output)</a:t>
-            </a:r>
-            <a:endParaRPr lang="en-US" dirty="0"/>
-          </a:p>
-          <a:p>
-            <a:endParaRPr lang="en-US" dirty="0"/>
-          </a:p>
-          <a:p>
+                <a:latin typeface="+mn-lt"/>
+                <a:ea typeface="+mn-ea"/>
+                <a:cs typeface="+mn-cs"/>
+              </a:rPr>
+              <a:t>Control with </a:t>
+            </a:r>
+            <a:r>
+              <a:rPr lang="en-US" sz="3200" b="1" kern="1200" dirty="0">
+                <a:solidFill>
+                  <a:schemeClr val="tx1"/>
+                </a:solidFill>
+                <a:effectLst/>
+                <a:latin typeface="+mn-lt"/>
+                <a:ea typeface="+mn-ea"/>
+                <a:cs typeface="+mn-cs"/>
+              </a:rPr>
+              <a:t>environment variables</a:t>
+            </a:r>
+          </a:p>
+          <a:p>
+            <a:pPr lvl="0"/>
+            <a:r>
+              <a:rPr lang="en-US" sz="3200" kern="1200" dirty="0">
+                <a:solidFill>
+                  <a:schemeClr val="tx1"/>
+                </a:solidFill>
+                <a:effectLst/>
+                <a:latin typeface="+mn-lt"/>
+                <a:ea typeface="+mn-ea"/>
+                <a:cs typeface="+mn-cs"/>
+              </a:rPr>
+              <a:t>Environment vars easy to sense</a:t>
+            </a:r>
+          </a:p>
+          <a:p>
+            <a:pPr lvl="0"/>
+            <a:r>
+              <a:rPr lang="en-US" kern="1200" dirty="0">
+                <a:solidFill>
+                  <a:schemeClr val="tx1"/>
+                </a:solidFill>
+                <a:effectLst/>
+                <a:latin typeface="+mn-lt"/>
+                <a:ea typeface="+mn-ea"/>
+                <a:cs typeface="+mn-cs"/>
+              </a:rPr>
+              <a:t>(Restart</a:t>
+            </a:r>
+            <a:r>
+              <a:rPr lang="en-US" kern="1200" baseline="0" dirty="0">
+                <a:solidFill>
+                  <a:schemeClr val="tx1"/>
+                </a:solidFill>
+                <a:effectLst/>
+                <a:latin typeface="+mn-lt"/>
+                <a:ea typeface="+mn-ea"/>
+                <a:cs typeface="+mn-cs"/>
+              </a:rPr>
+              <a:t> process when </a:t>
+            </a:r>
+            <a:r>
+              <a:rPr lang="en-US" kern="1200" baseline="0" dirty="0" err="1">
+                <a:solidFill>
+                  <a:schemeClr val="tx1"/>
+                </a:solidFill>
+                <a:effectLst/>
+                <a:latin typeface="+mn-lt"/>
+                <a:ea typeface="+mn-ea"/>
+                <a:cs typeface="+mn-cs"/>
+              </a:rPr>
+              <a:t>params</a:t>
+            </a:r>
+            <a:r>
+              <a:rPr lang="en-US" kern="1200" baseline="0" dirty="0">
+                <a:solidFill>
+                  <a:schemeClr val="tx1"/>
+                </a:solidFill>
+                <a:effectLst/>
+                <a:latin typeface="+mn-lt"/>
+                <a:ea typeface="+mn-ea"/>
+                <a:cs typeface="+mn-cs"/>
+              </a:rPr>
+              <a:t> change)</a:t>
+            </a:r>
+            <a:endParaRPr lang="en-US" kern="1200" dirty="0">
+              <a:solidFill>
+                <a:schemeClr val="tx1"/>
+              </a:solidFill>
+              <a:effectLst/>
+              <a:latin typeface="+mn-lt"/>
+              <a:ea typeface="+mn-ea"/>
+              <a:cs typeface="+mn-cs"/>
+            </a:endParaRPr>
+          </a:p>
+          <a:p>
+            <a:pPr marL="0" lvl="0" indent="0">
+              <a:buNone/>
+            </a:pPr>
+            <a:endParaRPr lang="en-US" sz="2400" kern="1200" dirty="0">
+              <a:solidFill>
+                <a:schemeClr val="tx1"/>
+              </a:solidFill>
+              <a:effectLst/>
+              <a:latin typeface="+mn-lt"/>
+              <a:ea typeface="+mn-ea"/>
+              <a:cs typeface="+mn-cs"/>
+            </a:endParaRPr>
+          </a:p>
+          <a:p>
+            <a:pPr marL="0" lvl="0" indent="0">
+              <a:buNone/>
+            </a:pPr>
+            <a:endParaRPr lang="en-US" sz="2400" kern="1200" dirty="0">
+              <a:solidFill>
+                <a:schemeClr val="tx1"/>
+              </a:solidFill>
+              <a:effectLst/>
+              <a:latin typeface="+mn-lt"/>
+              <a:ea typeface="+mn-ea"/>
+              <a:cs typeface="+mn-cs"/>
+            </a:endParaRPr>
+          </a:p>
+          <a:p>
+            <a:pPr lvl="0"/>
             <a:r>
               <a:rPr lang="en-US" sz="2400" b="1" dirty="0">
                 <a:solidFill>
                   <a:srgbClr val="00B050"/>
                 </a:solidFill>
               </a:rPr>
-              <a:t>&lt;code: timestamp&gt;</a:t>
-            </a:r>
-          </a:p>
-          <a:p>
-            <a:endParaRPr lang="en-US" dirty="0">
-              <a:effectLst/>
-            </a:endParaRPr>
+              <a:t>&lt;code: environment variable control&gt;</a:t>
+            </a:r>
           </a:p>
         </p:txBody>
       </p:sp>
@@ -5645,7 +5556,7 @@
     </p:spTree>
     <p:extLst>
       <p:ext uri="{BB962C8B-B14F-4D97-AF65-F5344CB8AC3E}">
-        <p14:creationId xmlns:p14="http://schemas.microsoft.com/office/powerpoint/2010/main" val="927184767"/>
+        <p14:creationId xmlns:p14="http://schemas.microsoft.com/office/powerpoint/2010/main" val="1887016969"/>
       </p:ext>
     </p:extLst>
   </p:cSld>
@@ -5684,16 +5595,18 @@
         </p:nvSpPr>
         <p:spPr/>
         <p:txBody>
-          <a:bodyPr/>
+          <a:bodyPr>
+            <a:normAutofit fontScale="90000"/>
+          </a:bodyPr>
           <a:lstStyle/>
           <a:p>
             <a:r>
               <a:rPr lang="en-US" dirty="0"/>
-              <a:t>Easy Control</a:t>
+              <a:t>Lesson: Keep the Debugging</a:t>
             </a:r>
             <a:r>
               <a:rPr lang="en-US" baseline="0" dirty="0"/>
-              <a:t> of Debug On/Off</a:t>
+              <a:t> Code</a:t>
             </a:r>
             <a:endParaRPr lang="en-US" dirty="0"/>
           </a:p>
@@ -5716,7 +5629,6 @@
           </a:bodyPr>
           <a:lstStyle/>
           <a:p>
-            <a:pPr lvl="0"/>
             <a:r>
               <a:rPr lang="en-US" sz="3200" kern="1200" dirty="0">
                 <a:solidFill>
@@ -5727,10 +5639,10 @@
                 <a:ea typeface="+mn-ea"/>
                 <a:cs typeface="+mn-cs"/>
               </a:rPr>
-              <a:t>Control with </a:t>
-            </a:r>
-            <a:r>
-              <a:rPr lang="en-US" sz="3200" b="1" kern="1200" dirty="0">
+              <a:t>No separate debug/</a:t>
+            </a:r>
+            <a:r>
+              <a:rPr lang="en-US" sz="3200" kern="1200" dirty="0" err="1">
                 <a:solidFill>
                   <a:schemeClr val="tx1"/>
                 </a:solidFill>
@@ -5739,11 +5651,8 @@
                 <a:ea typeface="+mn-ea"/>
                 <a:cs typeface="+mn-cs"/>
               </a:rPr>
-              <a:t>environment variables</a:t>
-            </a:r>
-          </a:p>
-          <a:p>
-            <a:pPr lvl="0"/>
+              <a:t>nondebug</a:t>
+            </a:r>
             <a:r>
               <a:rPr lang="en-US" sz="3200" kern="1200" dirty="0">
                 <a:solidFill>
@@ -5754,13 +5663,23 @@
                 <a:ea typeface="+mn-ea"/>
                 <a:cs typeface="+mn-cs"/>
               </a:rPr>
-              <a:t>Environment vars easy to sense</a:t>
-            </a:r>
-          </a:p>
-          <a:p>
-            <a:pPr lvl="0"/>
-            <a:r>
-              <a:rPr lang="en-US" kern="1200" dirty="0">
+              <a:t> versions </a:t>
+            </a:r>
+          </a:p>
+          <a:p>
+            <a:r>
+              <a:rPr lang="en-US" dirty="0"/>
+              <a:t>When customer calls with a problem...</a:t>
+            </a:r>
+          </a:p>
+          <a:p>
+            <a:pPr lvl="1"/>
+            <a:r>
+              <a:rPr lang="en-US" dirty="0"/>
+              <a:t>Did you leave </a:t>
+            </a:r>
+            <a:r>
+              <a:rPr lang="en-US" sz="2800" kern="1200" dirty="0">
                 <a:solidFill>
                   <a:schemeClr val="tx1"/>
                 </a:solidFill>
@@ -5769,10 +5688,13 @@
                 <a:ea typeface="+mn-ea"/>
                 <a:cs typeface="+mn-cs"/>
               </a:rPr>
-              <a:t>(Restart</a:t>
-            </a:r>
-            <a:r>
-              <a:rPr lang="en-US" kern="1200" baseline="0" dirty="0">
+              <a:t>tracing permanently installed?</a:t>
+            </a:r>
+          </a:p>
+          <a:p>
+            <a:pPr lvl="2"/>
+            <a:r>
+              <a:rPr lang="en-US" sz="2400" kern="1200" dirty="0">
                 <a:solidFill>
                   <a:schemeClr val="tx1"/>
                 </a:solidFill>
@@ -5781,46 +5703,15 @@
                 <a:ea typeface="+mn-ea"/>
                 <a:cs typeface="+mn-cs"/>
               </a:rPr>
-              <a:t> process when </a:t>
-            </a:r>
-            <a:r>
-              <a:rPr lang="en-US" kern="1200" baseline="0" dirty="0" err="1">
-                <a:solidFill>
-                  <a:schemeClr val="tx1"/>
-                </a:solidFill>
-                <a:effectLst/>
-                <a:latin typeface="+mn-lt"/>
-                <a:ea typeface="+mn-ea"/>
-                <a:cs typeface="+mn-cs"/>
-              </a:rPr>
-              <a:t>params</a:t>
-            </a:r>
-            <a:r>
-              <a:rPr lang="en-US" kern="1200" baseline="0" dirty="0">
-                <a:solidFill>
-                  <a:schemeClr val="tx1"/>
-                </a:solidFill>
-                <a:effectLst/>
-                <a:latin typeface="+mn-lt"/>
-                <a:ea typeface="+mn-ea"/>
-                <a:cs typeface="+mn-cs"/>
-              </a:rPr>
-              <a:t> change)</a:t>
-            </a:r>
-            <a:endParaRPr lang="en-US" kern="1200" dirty="0">
-              <a:solidFill>
-                <a:schemeClr val="tx1"/>
-              </a:solidFill>
-              <a:effectLst/>
-              <a:latin typeface="+mn-lt"/>
-              <a:ea typeface="+mn-ea"/>
-              <a:cs typeface="+mn-cs"/>
-            </a:endParaRPr>
-          </a:p>
-          <a:p>
-            <a:pPr marL="0" lvl="0" indent="0">
-              <a:buNone/>
-            </a:pPr>
+              <a:t>Just tell the customer to add a couple environment variables and restart</a:t>
+            </a:r>
+          </a:p>
+          <a:p>
+            <a:pPr lvl="2"/>
+            <a:r>
+              <a:rPr lang="en-US" dirty="0"/>
+              <a:t>Send me the log file</a:t>
+            </a:r>
             <a:endParaRPr lang="en-US" sz="2400" kern="1200" dirty="0">
               <a:solidFill>
                 <a:schemeClr val="tx1"/>
@@ -5832,28 +5723,18 @@
             </a:endParaRPr>
           </a:p>
           <a:p>
-            <a:pPr marL="0" lvl="0" indent="0">
-              <a:buNone/>
-            </a:pPr>
-            <a:endParaRPr lang="en-US" sz="2400" kern="1200" dirty="0">
-              <a:solidFill>
-                <a:schemeClr val="tx1"/>
-              </a:solidFill>
-              <a:effectLst/>
-              <a:latin typeface="+mn-lt"/>
-              <a:ea typeface="+mn-ea"/>
-              <a:cs typeface="+mn-cs"/>
-            </a:endParaRPr>
-          </a:p>
-          <a:p>
-            <a:pPr lvl="0"/>
-            <a:r>
-              <a:rPr lang="en-US" sz="2400" b="1" dirty="0">
-                <a:solidFill>
-                  <a:srgbClr val="00B050"/>
-                </a:solidFill>
-              </a:rPr>
-              <a:t>&lt;code: environment variable control&gt;</a:t>
+            <a:pPr lvl="3"/>
+            <a:r>
+              <a:rPr lang="en-US" sz="2000" kern="1200" dirty="0">
+                <a:solidFill>
+                  <a:schemeClr val="tx1"/>
+                </a:solidFill>
+                <a:effectLst/>
+                <a:latin typeface="+mn-lt"/>
+                <a:ea typeface="+mn-ea"/>
+                <a:cs typeface="+mn-cs"/>
+              </a:rPr>
+              <a:t>Yes, we actually did that</a:t>
             </a:r>
           </a:p>
         </p:txBody>
@@ -5929,7 +5810,7 @@
     </p:spTree>
     <p:extLst>
       <p:ext uri="{BB962C8B-B14F-4D97-AF65-F5344CB8AC3E}">
-        <p14:creationId xmlns:p14="http://schemas.microsoft.com/office/powerpoint/2010/main" val="1887016969"/>
+        <p14:creationId xmlns:p14="http://schemas.microsoft.com/office/powerpoint/2010/main" val="282592620"/>
       </p:ext>
     </p:extLst>
   </p:cSld>
@@ -5968,20 +5849,13 @@
         </p:nvSpPr>
         <p:spPr/>
         <p:txBody>
-          <a:bodyPr>
-            <a:normAutofit fontScale="90000"/>
-          </a:bodyPr>
+          <a:bodyPr/>
           <a:lstStyle/>
           <a:p>
             <a:r>
               <a:rPr lang="en-US" dirty="0"/>
-              <a:t>Lesson: Keep the Debugging</a:t>
-            </a:r>
-            <a:r>
-              <a:rPr lang="en-US" baseline="0" dirty="0"/>
-              <a:t> Code</a:t>
-            </a:r>
-            <a:endParaRPr lang="en-US" dirty="0"/>
+              <a:t>Output Where?</a:t>
+            </a:r>
           </a:p>
         </p:txBody>
       </p:sp>
@@ -5997,11 +5871,10 @@
         </p:nvSpPr>
         <p:spPr/>
         <p:txBody>
-          <a:bodyPr>
-            <a:normAutofit/>
-          </a:bodyPr>
-          <a:lstStyle/>
-          <a:p>
+          <a:bodyPr/>
+          <a:lstStyle/>
+          <a:p>
+            <a:pPr lvl="0"/>
             <a:r>
               <a:rPr lang="en-US" sz="3200" kern="1200" dirty="0">
                 <a:solidFill>
@@ -6012,7 +5885,7 @@
                 <a:ea typeface="+mn-ea"/>
                 <a:cs typeface="+mn-cs"/>
               </a:rPr>
-              <a:t>No separate debug/</a:t>
+              <a:t>Send to </a:t>
             </a:r>
             <a:r>
               <a:rPr lang="en-US" sz="3200" kern="1200" dirty="0" err="1">
@@ -6024,7 +5897,7 @@
                 <a:ea typeface="+mn-ea"/>
                 <a:cs typeface="+mn-cs"/>
               </a:rPr>
-              <a:t>nondebug</a:t>
+              <a:t>stdout</a:t>
             </a:r>
             <a:r>
               <a:rPr lang="en-US" sz="3200" kern="1200" dirty="0">
@@ -6036,21 +5909,11 @@
                 <a:ea typeface="+mn-ea"/>
                 <a:cs typeface="+mn-cs"/>
               </a:rPr>
-              <a:t> versions </a:t>
-            </a:r>
-          </a:p>
-          <a:p>
-            <a:r>
-              <a:rPr lang="en-US" dirty="0"/>
-              <a:t>When customer calls with a problem...</a:t>
+              <a:t> if possible</a:t>
             </a:r>
           </a:p>
           <a:p>
             <a:pPr lvl="1"/>
-            <a:r>
-              <a:rPr lang="en-US" dirty="0"/>
-              <a:t>Did you leave </a:t>
-            </a:r>
             <a:r>
               <a:rPr lang="en-US" sz="2800" kern="1200" dirty="0">
                 <a:solidFill>
@@ -6061,13 +5924,13 @@
                 <a:ea typeface="+mn-ea"/>
                 <a:cs typeface="+mn-cs"/>
               </a:rPr>
-              <a:t>tracing permanently installed?</a:t>
-            </a:r>
-          </a:p>
-          <a:p>
-            <a:pPr lvl="2"/>
-            <a:r>
-              <a:rPr lang="en-US" sz="2400" kern="1200" dirty="0">
+              <a:t>'less' utility</a:t>
+            </a:r>
+          </a:p>
+          <a:p>
+            <a:pPr lvl="1"/>
+            <a:r>
+              <a:rPr lang="en-US" sz="2800" kern="1200" dirty="0">
                 <a:solidFill>
                   <a:schemeClr val="tx1"/>
                 </a:solidFill>
@@ -6076,29 +5939,10 @@
                 <a:ea typeface="+mn-ea"/>
                 <a:cs typeface="+mn-cs"/>
               </a:rPr>
-              <a:t>Just tell the customer to add a couple environment variables and restart</a:t>
-            </a:r>
-          </a:p>
-          <a:p>
-            <a:pPr lvl="2"/>
-            <a:r>
-              <a:rPr lang="en-US" dirty="0"/>
-              <a:t>Send me the log file</a:t>
-            </a:r>
-            <a:endParaRPr lang="en-US" sz="2400" kern="1200" dirty="0">
-              <a:solidFill>
-                <a:schemeClr val="tx1"/>
-              </a:solidFill>
-              <a:effectLst/>
-              <a:latin typeface="+mn-lt"/>
-              <a:ea typeface="+mn-ea"/>
-              <a:cs typeface="+mn-cs"/>
-            </a:endParaRPr>
-          </a:p>
-          <a:p>
-            <a:pPr lvl="3"/>
-            <a:r>
-              <a:rPr lang="en-US" sz="2000" kern="1200" dirty="0">
+              <a:t>Need file output, too, if </a:t>
+            </a:r>
+            <a:r>
+              <a:rPr lang="en-US" sz="2800" kern="1200" dirty="0" err="1">
                 <a:solidFill>
                   <a:schemeClr val="tx1"/>
                 </a:solidFill>
@@ -6107,7 +5951,114 @@
                 <a:ea typeface="+mn-ea"/>
                 <a:cs typeface="+mn-cs"/>
               </a:rPr>
-              <a:t>Yes, we actually did that</a:t>
+              <a:t>stdout</a:t>
+            </a:r>
+            <a:r>
+              <a:rPr lang="en-US" sz="2800" kern="1200" dirty="0">
+                <a:solidFill>
+                  <a:schemeClr val="tx1"/>
+                </a:solidFill>
+                <a:effectLst/>
+                <a:latin typeface="+mn-lt"/>
+                <a:ea typeface="+mn-ea"/>
+                <a:cs typeface="+mn-cs"/>
+              </a:rPr>
+              <a:t> not available</a:t>
+            </a:r>
+          </a:p>
+          <a:p>
+            <a:pPr lvl="1"/>
+            <a:r>
+              <a:rPr lang="en-US" dirty="0"/>
+              <a:t>O</a:t>
+            </a:r>
+            <a:r>
+              <a:rPr lang="en-US" sz="2800" kern="1200" dirty="0">
+                <a:solidFill>
+                  <a:schemeClr val="tx1"/>
+                </a:solidFill>
+                <a:effectLst/>
+                <a:latin typeface="+mn-lt"/>
+                <a:ea typeface="+mn-ea"/>
+                <a:cs typeface="+mn-cs"/>
+              </a:rPr>
+              <a:t>ptional HTML tags</a:t>
+            </a:r>
+          </a:p>
+          <a:p>
+            <a:pPr lvl="1"/>
+            <a:r>
+              <a:rPr lang="en-US" sz="2800" kern="1200" dirty="0">
+                <a:solidFill>
+                  <a:schemeClr val="tx1"/>
+                </a:solidFill>
+                <a:effectLst/>
+                <a:latin typeface="+mn-lt"/>
+                <a:ea typeface="+mn-ea"/>
+                <a:cs typeface="+mn-cs"/>
+              </a:rPr>
+              <a:t>Maybe more than one output at a time,  </a:t>
+            </a:r>
+            <a:r>
+              <a:rPr lang="en-US" sz="2800" kern="1200" dirty="0" err="1">
+                <a:solidFill>
+                  <a:schemeClr val="tx1"/>
+                </a:solidFill>
+                <a:effectLst/>
+                <a:latin typeface="+mn-lt"/>
+                <a:ea typeface="+mn-ea"/>
+                <a:cs typeface="+mn-cs"/>
+              </a:rPr>
+              <a:t>e.g</a:t>
+            </a:r>
+            <a:r>
+              <a:rPr lang="en-US" sz="2800" kern="1200" dirty="0">
+                <a:solidFill>
+                  <a:schemeClr val="tx1"/>
+                </a:solidFill>
+                <a:effectLst/>
+                <a:latin typeface="+mn-lt"/>
+                <a:ea typeface="+mn-ea"/>
+                <a:cs typeface="+mn-cs"/>
+              </a:rPr>
+              <a:t>,  </a:t>
+            </a:r>
+            <a:r>
+              <a:rPr lang="en-US" sz="2800" kern="1200" dirty="0" err="1">
+                <a:solidFill>
+                  <a:schemeClr val="tx1"/>
+                </a:solidFill>
+                <a:effectLst/>
+                <a:latin typeface="+mn-lt"/>
+                <a:ea typeface="+mn-ea"/>
+                <a:cs typeface="+mn-cs"/>
+              </a:rPr>
+              <a:t>stdout</a:t>
+            </a:r>
+            <a:r>
+              <a:rPr lang="en-US" sz="2800" kern="1200" dirty="0">
+                <a:solidFill>
+                  <a:schemeClr val="tx1"/>
+                </a:solidFill>
+                <a:effectLst/>
+                <a:latin typeface="+mn-lt"/>
+                <a:ea typeface="+mn-ea"/>
+                <a:cs typeface="+mn-cs"/>
+              </a:rPr>
+              <a:t> and file</a:t>
+            </a:r>
+          </a:p>
+          <a:p>
+            <a:endParaRPr lang="en-US" dirty="0"/>
+          </a:p>
+          <a:p>
+            <a:r>
+              <a:rPr lang="en-US" sz="2400" b="1" dirty="0">
+                <a:solidFill>
+                  <a:srgbClr val="00B050"/>
+                </a:solidFill>
+              </a:rPr>
+              <a:t>&lt;code: looking at output&gt;</a:t>
             </a:r>
           </a:p>
         </p:txBody>
@@ -6183,7 +6134,7 @@
     </p:spTree>
     <p:extLst>
       <p:ext uri="{BB962C8B-B14F-4D97-AF65-F5344CB8AC3E}">
-        <p14:creationId xmlns:p14="http://schemas.microsoft.com/office/powerpoint/2010/main" val="282592620"/>
+        <p14:creationId xmlns:p14="http://schemas.microsoft.com/office/powerpoint/2010/main" val="4093681671"/>
       </p:ext>
     </p:extLst>
   </p:cSld>
@@ -6227,7 +6178,7 @@
           <a:p>
             <a:r>
               <a:rPr lang="en-US" dirty="0"/>
-              <a:t>Output Where?</a:t>
+              <a:t>Low Performance Impact</a:t>
             </a:r>
           </a:p>
         </p:txBody>
@@ -6258,10 +6209,13 @@
                 <a:ea typeface="+mn-ea"/>
                 <a:cs typeface="+mn-cs"/>
               </a:rPr>
-              <a:t>Send to </a:t>
-            </a:r>
-            <a:r>
-              <a:rPr lang="en-US" sz="3200" kern="1200" dirty="0" err="1">
+              <a:t>Without editing the source code</a:t>
+            </a:r>
+          </a:p>
+          <a:p>
+            <a:pPr lvl="1"/>
+            <a:r>
+              <a:rPr lang="en-US" sz="2800" kern="1200" dirty="0">
                 <a:solidFill>
                   <a:schemeClr val="tx1"/>
                 </a:solidFill>
@@ -6270,10 +6224,17 @@
                 <a:ea typeface="+mn-ea"/>
                 <a:cs typeface="+mn-cs"/>
               </a:rPr>
-              <a:t>stdout</a:t>
-            </a:r>
-            <a:r>
-              <a:rPr lang="en-US" sz="3200" kern="1200" dirty="0">
+              <a:t>Environment var eliminates almost all </a:t>
+            </a:r>
+            <a:r>
+              <a:rPr lang="en-US" dirty="0"/>
+              <a:t>code</a:t>
+            </a:r>
+          </a:p>
+          <a:p>
+            <a:pPr lvl="2"/>
+            <a:r>
+              <a:rPr lang="en-US" sz="2400" kern="1200" dirty="0">
                 <a:solidFill>
                   <a:schemeClr val="tx1"/>
                 </a:solidFill>
@@ -6282,8 +6243,32 @@
                 <a:ea typeface="+mn-ea"/>
                 <a:cs typeface="+mn-cs"/>
               </a:rPr>
-              <a:t> if possible</a:t>
-            </a:r>
+              <a:t>Null decorators</a:t>
+            </a:r>
+          </a:p>
+          <a:p>
+            <a:pPr lvl="2"/>
+            <a:r>
+              <a:rPr lang="en-US" dirty="0"/>
+              <a:t>Almost-null direct </a:t>
+            </a:r>
+            <a:r>
+              <a:rPr lang="en-US" dirty="0" err="1"/>
+              <a:t>ntrace</a:t>
+            </a:r>
+            <a:r>
+              <a:rPr lang="en-US" dirty="0"/>
+              <a:t> calls</a:t>
+            </a:r>
+            <a:endParaRPr lang="en-US" sz="2400" kern="1200" dirty="0">
+              <a:solidFill>
+                <a:schemeClr val="tx1"/>
+              </a:solidFill>
+              <a:effectLst/>
+              <a:latin typeface="+mn-lt"/>
+              <a:ea typeface="+mn-ea"/>
+              <a:cs typeface="+mn-cs"/>
+            </a:endParaRPr>
           </a:p>
           <a:p>
             <a:pPr lvl="1"/>
@@ -6297,13 +6282,10 @@
                 <a:ea typeface="+mn-ea"/>
                 <a:cs typeface="+mn-cs"/>
               </a:rPr>
-              <a:t>'less' utility</a:t>
-            </a:r>
-          </a:p>
-          <a:p>
-            <a:pPr lvl="1"/>
-            <a:r>
-              <a:rPr lang="en-US" sz="2800" kern="1200" dirty="0">
+              <a:t>Recompile</a:t>
+            </a:r>
+            <a:r>
+              <a:rPr lang="en-US" sz="2800" kern="1200" baseline="0" dirty="0">
                 <a:solidFill>
                   <a:schemeClr val="tx1"/>
                 </a:solidFill>
@@ -6312,126 +6294,21 @@
                 <a:ea typeface="+mn-ea"/>
                 <a:cs typeface="+mn-cs"/>
               </a:rPr>
-              <a:t>Need file output, too, if </a:t>
-            </a:r>
-            <a:r>
-              <a:rPr lang="en-US" sz="2800" kern="1200" dirty="0" err="1">
-                <a:solidFill>
-                  <a:schemeClr val="tx1"/>
-                </a:solidFill>
-                <a:effectLst/>
-                <a:latin typeface="+mn-lt"/>
-                <a:ea typeface="+mn-ea"/>
-                <a:cs typeface="+mn-cs"/>
-              </a:rPr>
-              <a:t>stdout</a:t>
-            </a:r>
-            <a:r>
-              <a:rPr lang="en-US" sz="2800" kern="1200" dirty="0">
-                <a:solidFill>
-                  <a:schemeClr val="tx1"/>
-                </a:solidFill>
-                <a:effectLst/>
-                <a:latin typeface="+mn-lt"/>
-                <a:ea typeface="+mn-ea"/>
-                <a:cs typeface="+mn-cs"/>
-              </a:rPr>
-              <a:t> not available</a:t>
-            </a:r>
-          </a:p>
-          <a:p>
-            <a:pPr lvl="1"/>
-            <a:r>
-              <a:rPr lang="en-US" dirty="0"/>
-              <a:t>O</a:t>
-            </a:r>
-            <a:r>
-              <a:rPr lang="en-US" sz="2800" kern="1200" dirty="0">
-                <a:solidFill>
-                  <a:schemeClr val="tx1"/>
-                </a:solidFill>
-                <a:effectLst/>
-                <a:latin typeface="+mn-lt"/>
-                <a:ea typeface="+mn-ea"/>
-                <a:cs typeface="+mn-cs"/>
-              </a:rPr>
-              <a:t>ptional HTML tags</a:t>
-            </a:r>
-          </a:p>
-          <a:p>
-            <a:pPr lvl="1"/>
-            <a:r>
-              <a:rPr lang="en-US" sz="2800" kern="1200" dirty="0">
-                <a:solidFill>
-                  <a:schemeClr val="tx1"/>
-                </a:solidFill>
-                <a:effectLst/>
-                <a:latin typeface="+mn-lt"/>
-                <a:ea typeface="+mn-ea"/>
-                <a:cs typeface="+mn-cs"/>
-              </a:rPr>
-              <a:t>Maybe more than one output at a time,  </a:t>
-            </a:r>
-            <a:r>
-              <a:rPr lang="en-US" sz="2800" kern="1200" dirty="0" err="1">
-                <a:solidFill>
-                  <a:schemeClr val="tx1"/>
-                </a:solidFill>
-                <a:effectLst/>
-                <a:latin typeface="+mn-lt"/>
-                <a:ea typeface="+mn-ea"/>
-                <a:cs typeface="+mn-cs"/>
-              </a:rPr>
-              <a:t>e.g</a:t>
-            </a:r>
-            <a:r>
-              <a:rPr lang="en-US" sz="2800" kern="1200" dirty="0">
-                <a:solidFill>
-                  <a:schemeClr val="tx1"/>
-                </a:solidFill>
-                <a:effectLst/>
-                <a:latin typeface="+mn-lt"/>
-                <a:ea typeface="+mn-ea"/>
-                <a:cs typeface="+mn-cs"/>
-              </a:rPr>
-              <a:t>,  </a:t>
-            </a:r>
-            <a:r>
-              <a:rPr lang="en-US" sz="2800" kern="1200" dirty="0" err="1">
-                <a:solidFill>
-                  <a:schemeClr val="tx1"/>
-                </a:solidFill>
-                <a:effectLst/>
-                <a:latin typeface="+mn-lt"/>
-                <a:ea typeface="+mn-ea"/>
-                <a:cs typeface="+mn-cs"/>
-              </a:rPr>
-              <a:t>stdout</a:t>
-            </a:r>
-            <a:r>
-              <a:rPr lang="en-US" sz="2800" kern="1200" dirty="0">
-                <a:solidFill>
-                  <a:schemeClr val="tx1"/>
-                </a:solidFill>
-                <a:effectLst/>
-                <a:latin typeface="+mn-lt"/>
-                <a:ea typeface="+mn-ea"/>
-                <a:cs typeface="+mn-cs"/>
-              </a:rPr>
-              <a:t> and file</a:t>
-            </a:r>
-          </a:p>
-          <a:p>
+              <a:t> if you change production on/off</a:t>
+            </a:r>
             <a:endParaRPr lang="en-US" dirty="0"/>
           </a:p>
           <a:p>
+            <a:endParaRPr lang="en-US" sz="2800" dirty="0"/>
+          </a:p>
+          <a:p>
             <a:r>
               <a:rPr lang="en-US" sz="2400" b="1" dirty="0">
                 <a:solidFill>
                   <a:srgbClr val="00B050"/>
                 </a:solidFill>
               </a:rPr>
-              <a:t>&lt;code: looking at output&gt;</a:t>
+              <a:t>&lt;code: if production mode&gt;</a:t>
             </a:r>
           </a:p>
         </p:txBody>
@@ -6507,7 +6384,7 @@
     </p:spTree>
     <p:extLst>
       <p:ext uri="{BB962C8B-B14F-4D97-AF65-F5344CB8AC3E}">
-        <p14:creationId xmlns:p14="http://schemas.microsoft.com/office/powerpoint/2010/main" val="4093681671"/>
+        <p14:creationId xmlns:p14="http://schemas.microsoft.com/office/powerpoint/2010/main" val="4110990006"/>
       </p:ext>
     </p:extLst>
   </p:cSld>
@@ -6901,7 +6778,7 @@
           <a:p>
             <a:r>
               <a:rPr lang="en-US" dirty="0"/>
-              <a:t>Low Performance Impact</a:t>
+              <a:t>The Package I Use</a:t>
             </a:r>
           </a:p>
         </p:txBody>
@@ -6921,117 +6798,38 @@
           <a:bodyPr/>
           <a:lstStyle/>
           <a:p>
+            <a:r>
+              <a:rPr lang="en-US" dirty="0"/>
+              <a:t>One file, one</a:t>
+            </a:r>
+            <a:r>
+              <a:rPr lang="en-US" baseline="0" dirty="0"/>
+              <a:t> class</a:t>
+            </a:r>
+          </a:p>
+          <a:p>
+            <a:pPr lvl="1"/>
+            <a:r>
+              <a:rPr lang="en-US" dirty="0"/>
+              <a:t>Functions to write</a:t>
+            </a:r>
+            <a:r>
+              <a:rPr lang="en-US" baseline="0" dirty="0"/>
+              <a:t> traces</a:t>
+            </a:r>
+          </a:p>
+          <a:p>
+            <a:pPr lvl="1"/>
+            <a:r>
+              <a:rPr lang="en-US" baseline="0" dirty="0"/>
+              <a:t>Decorators that use the functions</a:t>
+            </a:r>
+          </a:p>
+          <a:p>
             <a:pPr lvl="0"/>
             <a:r>
-              <a:rPr lang="en-US" sz="3200" kern="1200" dirty="0">
-                <a:solidFill>
-                  <a:schemeClr val="tx1"/>
-                </a:solidFill>
-                <a:effectLst/>
-                <a:latin typeface="+mn-lt"/>
-                <a:ea typeface="+mn-ea"/>
-                <a:cs typeface="+mn-cs"/>
-              </a:rPr>
-              <a:t>Without editing the source code</a:t>
-            </a:r>
-          </a:p>
-          <a:p>
-            <a:pPr lvl="1"/>
-            <a:r>
-              <a:rPr lang="en-US" sz="2800" kern="1200" dirty="0">
-                <a:solidFill>
-                  <a:schemeClr val="tx1"/>
-                </a:solidFill>
-                <a:effectLst/>
-                <a:latin typeface="+mn-lt"/>
-                <a:ea typeface="+mn-ea"/>
-                <a:cs typeface="+mn-cs"/>
-              </a:rPr>
-              <a:t>Environment var eliminates almost all </a:t>
-            </a:r>
-            <a:r>
-              <a:rPr lang="en-US" dirty="0"/>
-              <a:t>code</a:t>
-            </a:r>
-          </a:p>
-          <a:p>
-            <a:pPr lvl="2"/>
-            <a:r>
-              <a:rPr lang="en-US" sz="2400" kern="1200" dirty="0">
-                <a:solidFill>
-                  <a:schemeClr val="tx1"/>
-                </a:solidFill>
-                <a:effectLst/>
-                <a:latin typeface="+mn-lt"/>
-                <a:ea typeface="+mn-ea"/>
-                <a:cs typeface="+mn-cs"/>
-              </a:rPr>
-              <a:t>Null decorators</a:t>
-            </a:r>
-          </a:p>
-          <a:p>
-            <a:pPr lvl="2"/>
-            <a:r>
-              <a:rPr lang="en-US" dirty="0"/>
-              <a:t>Almost-null direct </a:t>
-            </a:r>
-            <a:r>
-              <a:rPr lang="en-US" dirty="0" err="1"/>
-              <a:t>ntrace</a:t>
-            </a:r>
-            <a:r>
-              <a:rPr lang="en-US" dirty="0"/>
-              <a:t> calls</a:t>
-            </a:r>
-            <a:endParaRPr lang="en-US" sz="2400" kern="1200" dirty="0">
-              <a:solidFill>
-                <a:schemeClr val="tx1"/>
-              </a:solidFill>
-              <a:effectLst/>
-              <a:latin typeface="+mn-lt"/>
-              <a:ea typeface="+mn-ea"/>
-              <a:cs typeface="+mn-cs"/>
-            </a:endParaRPr>
-          </a:p>
-          <a:p>
-            <a:pPr lvl="1"/>
-            <a:r>
-              <a:rPr lang="en-US" sz="2800" kern="1200" dirty="0">
-                <a:solidFill>
-                  <a:schemeClr val="tx1"/>
-                </a:solidFill>
-                <a:effectLst/>
-                <a:latin typeface="+mn-lt"/>
-                <a:ea typeface="+mn-ea"/>
-                <a:cs typeface="+mn-cs"/>
-              </a:rPr>
-              <a:t>Recompile</a:t>
-            </a:r>
-            <a:r>
-              <a:rPr lang="en-US" sz="2800" kern="1200" baseline="0" dirty="0">
-                <a:solidFill>
-                  <a:schemeClr val="tx1"/>
-                </a:solidFill>
-                <a:effectLst/>
-                <a:latin typeface="+mn-lt"/>
-                <a:ea typeface="+mn-ea"/>
-                <a:cs typeface="+mn-cs"/>
-              </a:rPr>
-              <a:t> if you change production on/off</a:t>
-            </a:r>
-            <a:endParaRPr lang="en-US" dirty="0"/>
-          </a:p>
-          <a:p>
-            <a:endParaRPr lang="en-US" sz="2800" dirty="0"/>
-          </a:p>
-          <a:p>
-            <a:r>
-              <a:rPr lang="en-US" sz="2400" b="1" dirty="0">
-                <a:solidFill>
-                  <a:srgbClr val="00B050"/>
-                </a:solidFill>
-              </a:rPr>
-              <a:t>&lt;code: if production mode&gt;</a:t>
+              <a:rPr lang="en-US" baseline="0" dirty="0"/>
+              <a:t>Singleton instance of the class</a:t>
             </a:r>
           </a:p>
         </p:txBody>
@@ -7107,7 +6905,7 @@
     </p:spTree>
     <p:extLst>
       <p:ext uri="{BB962C8B-B14F-4D97-AF65-F5344CB8AC3E}">
-        <p14:creationId xmlns:p14="http://schemas.microsoft.com/office/powerpoint/2010/main" val="4110990006"/>
+        <p14:creationId xmlns:p14="http://schemas.microsoft.com/office/powerpoint/2010/main" val="1908140639"/>
       </p:ext>
     </p:extLst>
   </p:cSld>
@@ -7151,7 +6949,7 @@
           <a:p>
             <a:r>
               <a:rPr lang="en-US" dirty="0"/>
-              <a:t>The Package I Use</a:t>
+              <a:t>Why Singleton Instance?</a:t>
             </a:r>
           </a:p>
         </p:txBody>
@@ -7173,37 +6971,91 @@
           <a:p>
             <a:r>
               <a:rPr lang="en-US" dirty="0"/>
-              <a:t>One file, one</a:t>
+              <a:t>Efficiency</a:t>
+            </a:r>
+          </a:p>
+          <a:p>
+            <a:pPr lvl="1"/>
+            <a:r>
+              <a:rPr lang="en-US" dirty="0"/>
+              <a:t>Evaluate conditional code at compile time</a:t>
+            </a:r>
+          </a:p>
+          <a:p>
+            <a:pPr lvl="1"/>
+            <a:r>
+              <a:rPr lang="en-US" dirty="0"/>
+              <a:t>Read run </a:t>
+            </a:r>
+            <a:r>
+              <a:rPr lang="en-US" dirty="0" err="1"/>
+              <a:t>envir</a:t>
             </a:r>
             <a:r>
               <a:rPr lang="en-US" baseline="0" dirty="0"/>
-              <a:t> class</a:t>
-            </a:r>
-          </a:p>
-          <a:p>
-            <a:pPr lvl="1"/>
+              <a:t> </a:t>
+            </a:r>
+            <a:r>
+              <a:rPr lang="en-US" baseline="0" dirty="0" err="1"/>
+              <a:t>var</a:t>
+            </a:r>
+            <a:r>
+              <a:rPr lang="en-US" baseline="0" dirty="0"/>
+              <a:t> </a:t>
+            </a:r>
+            <a:r>
+              <a:rPr lang="en-US" dirty="0" err="1"/>
+              <a:t>params</a:t>
+            </a:r>
             <a:r>
               <a:rPr lang="en-US" dirty="0"/>
-              <a:t>Functions to write</a:t>
-            </a:r>
-            <a:r>
-              <a:rPr lang="en-US" baseline="0" dirty="0"/>
-              <a:t> traces</a:t>
-            </a:r>
-          </a:p>
-          <a:p>
-            <a:pPr lvl="1"/>
-            <a:r>
-              <a:rPr lang="en-US" baseline="0" dirty="0"/>
-              <a:t>Decorators that use the functions</a:t>
-            </a:r>
-          </a:p>
-          <a:p>
-            <a:pPr lvl="0"/>
-            <a:r>
-              <a:rPr lang="en-US" baseline="0" dirty="0"/>
-              <a:t>Singleton instance of the class</a:t>
-            </a:r>
+              <a:t> only once</a:t>
+            </a:r>
+            <a:endParaRPr lang="en-US" baseline="0" dirty="0"/>
+          </a:p>
+          <a:p>
+            <a:pPr rtl="0" eaLnBrk="1" latinLnBrk="0" hangingPunct="1"/>
+            <a:r>
+              <a:rPr lang="en-US" dirty="0">
+                <a:effectLst/>
+              </a:rPr>
+              <a:t>Less for programmer to write</a:t>
+            </a:r>
+          </a:p>
+          <a:p>
+            <a:pPr rtl="0" eaLnBrk="1" latinLnBrk="0" hangingPunct="1"/>
+            <a:endParaRPr lang="en-US" dirty="0">
+              <a:effectLst/>
+            </a:endParaRPr>
+          </a:p>
+          <a:p>
+            <a:pPr rtl="0" eaLnBrk="1" latinLnBrk="0" hangingPunct="1"/>
+            <a:r>
+              <a:rPr lang="en-US" sz="2400" b="1" dirty="0">
+                <a:solidFill>
+                  <a:srgbClr val="00B050"/>
+                </a:solidFill>
+              </a:rPr>
+              <a:t>&lt;code: imports&gt;</a:t>
+            </a:r>
+          </a:p>
+          <a:p>
+            <a:pPr rtl="0" eaLnBrk="1" latinLnBrk="0" hangingPunct="1"/>
+            <a:r>
+              <a:rPr lang="en-US" sz="2400" b="1" dirty="0">
+                <a:solidFill>
+                  <a:srgbClr val="00B050"/>
+                </a:solidFill>
+              </a:rPr>
+              <a:t>&lt;code: singleton&gt;</a:t>
+            </a:r>
+          </a:p>
+          <a:p>
+            <a:endParaRPr lang="en-US" b="1" dirty="0">
+              <a:solidFill>
+                <a:srgbClr val="00B050"/>
+              </a:solidFill>
+            </a:endParaRPr>
           </a:p>
         </p:txBody>
       </p:sp>
@@ -7278,7 +7130,7 @@
     </p:spTree>
     <p:extLst>
       <p:ext uri="{BB962C8B-B14F-4D97-AF65-F5344CB8AC3E}">
-        <p14:creationId xmlns:p14="http://schemas.microsoft.com/office/powerpoint/2010/main" val="1908140639"/>
+        <p14:creationId xmlns:p14="http://schemas.microsoft.com/office/powerpoint/2010/main" val="144515002"/>
       </p:ext>
     </p:extLst>
   </p:cSld>
@@ -7322,7 +7174,7 @@
           <a:p>
             <a:r>
               <a:rPr lang="en-US" dirty="0"/>
-              <a:t>Why Singleton Instance?</a:t>
+              <a:t>Trace Functions</a:t>
             </a:r>
           </a:p>
         </p:txBody>
@@ -7343,26 +7195,12 @@
           <a:lstStyle/>
           <a:p>
             <a:r>
+              <a:rPr lang="en-US" dirty="0" err="1"/>
+              <a:t>ntrace</a:t>
+            </a:r>
+            <a:r>
               <a:rPr lang="en-US" dirty="0"/>
-              <a:t>Efficiency</a:t>
-            </a:r>
-          </a:p>
-          <a:p>
-            <a:pPr lvl="1"/>
-            <a:r>
-              <a:rPr lang="en-US" dirty="0"/>
-              <a:t>Evaluate conditional code at compile time</a:t>
-            </a:r>
-          </a:p>
-          <a:p>
-            <a:pPr lvl="1"/>
-            <a:r>
-              <a:rPr lang="en-US" dirty="0"/>
-              <a:t>Read run </a:t>
-            </a:r>
-            <a:r>
-              <a:rPr lang="en-US" dirty="0" err="1"/>
-              <a:t>envir</a:t>
+              <a:t>(priority,</a:t>
             </a:r>
             <a:r>
               <a:rPr lang="en-US" baseline="0" dirty="0"/>
@@ -7370,65 +7208,60 @@
             </a:r>
             <a:r>
               <a:rPr lang="en-US" baseline="0" dirty="0" err="1"/>
-              <a:t>var</a:t>
+              <a:t>outputline</a:t>
+            </a:r>
+            <a:r>
+              <a:rPr lang="en-US" dirty="0"/>
+              <a:t>)</a:t>
+            </a:r>
+          </a:p>
+          <a:p>
+            <a:r>
+              <a:rPr lang="en-US" baseline="0" dirty="0" err="1"/>
+              <a:t>ntracef</a:t>
             </a:r>
             <a:r>
               <a:rPr lang="en-US" baseline="0" dirty="0"/>
-              <a:t> </a:t>
-            </a:r>
-            <a:r>
-              <a:rPr lang="en-US" dirty="0" err="1"/>
-              <a:t>params</a:t>
-            </a:r>
+              <a:t>(priority, </a:t>
+            </a:r>
+            <a:r>
+              <a:rPr lang="en-US" baseline="0" dirty="0" err="1"/>
+              <a:t>facilityname</a:t>
+            </a:r>
+            <a:r>
+              <a:rPr lang="en-US" baseline="0" dirty="0"/>
+              <a:t>, </a:t>
+            </a:r>
+            <a:r>
+              <a:rPr lang="en-US" baseline="0" dirty="0" err="1"/>
+              <a:t>outputline</a:t>
+            </a:r>
+            <a:r>
+              <a:rPr lang="en-US" baseline="0" dirty="0"/>
+              <a:t>)</a:t>
+            </a:r>
+          </a:p>
+          <a:p>
+            <a:endParaRPr lang="en-US" dirty="0"/>
+          </a:p>
+          <a:p>
             <a:r>
               <a:rPr lang="en-US" dirty="0"/>
-              <a:t> only once</a:t>
-            </a:r>
-            <a:endParaRPr lang="en-US" baseline="0" dirty="0"/>
-          </a:p>
-          <a:p>
-            <a:pPr rtl="0" eaLnBrk="1" latinLnBrk="0" hangingPunct="1"/>
-            <a:r>
-              <a:rPr lang="en-US" dirty="0">
-                <a:effectLst/>
-              </a:rPr>
-              <a:t>Less for programmer to write</a:t>
-            </a:r>
-          </a:p>
-          <a:p>
-            <a:pPr rtl="0" eaLnBrk="1" latinLnBrk="0" hangingPunct="1"/>
-            <a:endParaRPr lang="en-US" dirty="0">
-              <a:effectLst/>
-            </a:endParaRPr>
-          </a:p>
-          <a:p>
-            <a:pPr rtl="0" eaLnBrk="1" latinLnBrk="0" hangingPunct="1"/>
+              <a:t>Instance of class to access these functions</a:t>
+            </a:r>
+          </a:p>
+          <a:p>
+            <a:endParaRPr lang="en-US" dirty="0"/>
+          </a:p>
+          <a:p>
             <a:r>
               <a:rPr lang="en-US" sz="2400" b="1" dirty="0">
                 <a:solidFill>
                   <a:srgbClr val="00B050"/>
                 </a:solidFill>
               </a:rPr>
-              <a:t>&lt;code: imports&gt;</a:t>
-            </a:r>
-          </a:p>
-          <a:p>
-            <a:pPr rtl="0" eaLnBrk="1" latinLnBrk="0" hangingPunct="1"/>
-            <a:r>
-              <a:rPr lang="en-US" sz="2400" b="1" dirty="0">
-                <a:solidFill>
-                  <a:srgbClr val="00B050"/>
-                </a:solidFill>
-              </a:rPr>
-              <a:t>&lt;code: singleton&gt;</a:t>
-            </a:r>
-          </a:p>
-          <a:p>
-            <a:endParaRPr lang="en-US" b="1" dirty="0">
-              <a:solidFill>
-                <a:srgbClr val="00B050"/>
-              </a:solidFill>
-            </a:endParaRPr>
+              <a:t>&lt;code: NTRC examples&gt;</a:t>
+            </a:r>
           </a:p>
         </p:txBody>
       </p:sp>
@@ -7503,7 +7336,7 @@
     </p:spTree>
     <p:extLst>
       <p:ext uri="{BB962C8B-B14F-4D97-AF65-F5344CB8AC3E}">
-        <p14:creationId xmlns:p14="http://schemas.microsoft.com/office/powerpoint/2010/main" val="144515002"/>
+        <p14:creationId xmlns:p14="http://schemas.microsoft.com/office/powerpoint/2010/main" val="1877482679"/>
       </p:ext>
     </p:extLst>
   </p:cSld>
@@ -7547,7 +7380,7 @@
           <a:p>
             <a:r>
               <a:rPr lang="en-US" dirty="0"/>
-              <a:t>Trace Functions</a:t>
+              <a:t>Decorators</a:t>
             </a:r>
           </a:p>
         </p:txBody>
@@ -7567,51 +7400,36 @@
           <a:bodyPr/>
           <a:lstStyle/>
           <a:p>
+            <a:r>
+              <a:rPr lang="en-US" dirty="0"/>
+              <a:t>@</a:t>
+            </a:r>
             <a:r>
               <a:rPr lang="en-US" dirty="0" err="1"/>
               <a:t>ntrace</a:t>
             </a:r>
+            <a:endParaRPr lang="en-US" dirty="0"/>
+          </a:p>
+          <a:p>
             <a:r>
               <a:rPr lang="en-US" dirty="0"/>
-              <a:t>(priority,</a:t>
-            </a:r>
-            <a:r>
-              <a:rPr lang="en-US" baseline="0" dirty="0"/>
-              <a:t> </a:t>
-            </a:r>
-            <a:r>
-              <a:rPr lang="en-US" baseline="0" dirty="0" err="1"/>
-              <a:t>outputline</a:t>
+              <a:t>@</a:t>
+            </a:r>
+            <a:r>
+              <a:rPr lang="en-US" dirty="0" err="1"/>
+              <a:t>ntracef</a:t>
             </a:r>
             <a:r>
               <a:rPr lang="en-US" dirty="0"/>
-              <a:t>)</a:t>
-            </a:r>
-          </a:p>
-          <a:p>
-            <a:r>
-              <a:rPr lang="en-US" baseline="0" dirty="0" err="1"/>
-              <a:t>ntracef</a:t>
-            </a:r>
-            <a:r>
-              <a:rPr lang="en-US" baseline="0" dirty="0"/>
-              <a:t>(priority, </a:t>
-            </a:r>
-            <a:r>
-              <a:rPr lang="en-US" baseline="0" dirty="0" err="1"/>
+              <a:t>(</a:t>
+            </a:r>
+            <a:r>
+              <a:rPr lang="en-US" dirty="0" err="1"/>
               <a:t>facilityname</a:t>
             </a:r>
             <a:r>
-              <a:rPr lang="en-US" baseline="0" dirty="0"/>
-              <a:t>, </a:t>
-            </a:r>
-            <a:r>
-              <a:rPr lang="en-US" baseline="0" dirty="0" err="1"/>
-              <a:t>outputline</a:t>
-            </a:r>
-            <a:r>
-              <a:rPr lang="en-US" baseline="0" dirty="0"/>
-              <a:t>)</a:t>
+              <a:rPr lang="en-US" dirty="0"/>
+              <a:t>, priority)</a:t>
             </a:r>
           </a:p>
           <a:p>
@@ -7619,22 +7437,26 @@
           </a:p>
           <a:p>
             <a:r>
-              <a:rPr lang="en-US" dirty="0"/>
-              <a:t>Instance of class to access these functions</a:t>
-            </a:r>
-          </a:p>
-          <a:p>
-            <a:endParaRPr lang="en-US" dirty="0"/>
-          </a:p>
-          <a:p>
-            <a:r>
               <a:rPr lang="en-US" sz="2400" b="1" dirty="0">
                 <a:solidFill>
                   <a:srgbClr val="00B050"/>
                 </a:solidFill>
               </a:rPr>
-              <a:t>&lt;code: NTRC examples&gt;</a:t>
-            </a:r>
+              <a:t>&lt;code:</a:t>
+            </a:r>
+            <a:r>
+              <a:rPr lang="en-US" sz="2400" b="1" baseline="0" dirty="0">
+                <a:solidFill>
+                  <a:srgbClr val="00B050"/>
+                </a:solidFill>
+              </a:rPr>
+              <a:t> decorator examples&gt;</a:t>
+            </a:r>
+            <a:endParaRPr lang="en-US" sz="2400" b="1" dirty="0">
+              <a:solidFill>
+                <a:srgbClr val="00B050"/>
+              </a:solidFill>
+            </a:endParaRPr>
           </a:p>
         </p:txBody>
       </p:sp>
@@ -7709,7 +7531,7 @@
     </p:spTree>
     <p:extLst>
       <p:ext uri="{BB962C8B-B14F-4D97-AF65-F5344CB8AC3E}">
-        <p14:creationId xmlns:p14="http://schemas.microsoft.com/office/powerpoint/2010/main" val="1877482679"/>
+        <p14:creationId xmlns:p14="http://schemas.microsoft.com/office/powerpoint/2010/main" val="3031580383"/>
       </p:ext>
     </p:extLst>
   </p:cSld>
@@ -7753,7 +7575,7 @@
           <a:p>
             <a:r>
               <a:rPr lang="en-US" dirty="0"/>
-              <a:t>Decorators</a:t>
+              <a:t>Filtering on Priority,  Facility</a:t>
             </a:r>
           </a:p>
         </p:txBody>
@@ -7773,63 +7595,80 @@
           <a:bodyPr/>
           <a:lstStyle/>
           <a:p>
+            <a:pPr marL="342900" marR="0" lvl="0" indent="-342900" algn="l" defTabSz="914400" rtl="0" eaLnBrk="1" fontAlgn="auto" latinLnBrk="0" hangingPunct="1">
+              <a:lnSpc>
+                <a:spcPct val="100000"/>
+              </a:lnSpc>
+              <a:spcBef>
+                <a:spcPct val="20000"/>
+              </a:spcBef>
+              <a:spcAft>
+                <a:spcPts val="0"/>
+              </a:spcAft>
+              <a:buClrTx/>
+              <a:buSzTx/>
+              <a:buFont typeface="Arial" panose="020B0604020202020204" pitchFamily="34" charset="0"/>
+              <a:buChar char="•"/>
+              <a:tabLst/>
+              <a:defRPr/>
+            </a:pPr>
+            <a:r>
+              <a:rPr lang="en-US" sz="3200" kern="1200" dirty="0">
+                <a:solidFill>
+                  <a:schemeClr val="tx1"/>
+                </a:solidFill>
+                <a:effectLst/>
+                <a:latin typeface="+mn-lt"/>
+                <a:ea typeface="+mn-ea"/>
+                <a:cs typeface="+mn-cs"/>
+              </a:rPr>
+              <a:t>Filtering makes listings short and to the point, when needed</a:t>
+            </a:r>
+          </a:p>
+          <a:p>
+            <a:pPr lvl="0"/>
+            <a:r>
+              <a:rPr lang="en-US" dirty="0" err="1"/>
+              <a:t>Envir</a:t>
+            </a:r>
             <a:r>
               <a:rPr lang="en-US" dirty="0"/>
-              <a:t>@</a:t>
+              <a:t> </a:t>
             </a:r>
             <a:r>
               <a:rPr lang="en-US" dirty="0" err="1"/>
-              <a:t>ntrace</a:t>
-            </a:r>
-            <a:endParaRPr lang="en-US" dirty="0"/>
-          </a:p>
-          <a:p>
+              <a:t>vars</a:t>
+            </a:r>
             <a:r>
               <a:rPr lang="en-US" dirty="0"/>
-              <a:t>@</a:t>
+              <a:t> </a:t>
+            </a:r>
+          </a:p>
+          <a:p>
+            <a:pPr lvl="1"/>
+            <a:r>
+              <a:rPr lang="en-US" dirty="0"/>
+              <a:t>TRACE_LEVEL (</a:t>
             </a:r>
             <a:r>
               <a:rPr lang="en-US" dirty="0" err="1"/>
-              <a:t>ntracef</a:t>
+              <a:t>int</a:t>
             </a:r>
             <a:r>
               <a:rPr lang="en-US" dirty="0"/>
-              <a:t>(</a:t>
-            </a:r>
-            <a:r>
-              <a:rPr lang="en-US" dirty="0" err="1"/>
-              <a:t>facilityname</a:t>
-            </a:r>
-            <a:r>
-              <a:rPr lang="en-US" dirty="0"/>
-              <a:t>, priority)</a:t>
-            </a:r>
-          </a:p>
-          <a:p>
-            <a:endParaRPr lang="en-US" dirty="0"/>
-          </a:p>
-          <a:p>
-            <a:r>
-              <a:rPr lang="en-US" sz="2400" b="1" dirty="0">
-                <a:solidFill>
-                  <a:srgbClr val="00B050"/>
-                </a:solidFill>
-              </a:rPr>
-              <a:t>&lt;code:</a:t>
-            </a:r>
-            <a:r>
-              <a:rPr lang="en-US" sz="2400" b="1" baseline="0" dirty="0">
-                <a:solidFill>
-                  <a:srgbClr val="00B050"/>
-                </a:solidFill>
-              </a:rPr>
-              <a:t> decorator examples&gt;</a:t>
-            </a:r>
-            <a:endParaRPr lang="en-US" sz="2400" b="1" dirty="0">
-              <a:solidFill>
-                <a:srgbClr val="00B050"/>
-              </a:solidFill>
-            </a:endParaRPr>
+              <a:t>)</a:t>
+            </a:r>
+            <a:r>
+              <a:rPr lang="en-US" baseline="0" dirty="0"/>
+              <a:t> </a:t>
+            </a:r>
+          </a:p>
+          <a:p>
+            <a:pPr lvl="1"/>
+            <a:r>
+              <a:rPr lang="en-US" baseline="0" dirty="0"/>
+              <a:t>TRACE_FACIL (string)</a:t>
+            </a:r>
           </a:p>
         </p:txBody>
       </p:sp>
@@ -7904,7 +7743,7 @@
     </p:spTree>
     <p:extLst>
       <p:ext uri="{BB962C8B-B14F-4D97-AF65-F5344CB8AC3E}">
-        <p14:creationId xmlns:p14="http://schemas.microsoft.com/office/powerpoint/2010/main" val="3031580383"/>
+        <p14:creationId xmlns:p14="http://schemas.microsoft.com/office/powerpoint/2010/main" val="2671257923"/>
       </p:ext>
     </p:extLst>
   </p:cSld>
@@ -7947,100 +7786,116 @@
           <a:lstStyle/>
           <a:p>
             <a:r>
+              <a:rPr lang="en-US" baseline="0" dirty="0"/>
+              <a:t>Detail Levels I Use</a:t>
+            </a:r>
+            <a:endParaRPr lang="en-US" dirty="0"/>
+          </a:p>
+        </p:txBody>
+      </p:sp>
+      <p:sp>
+        <p:nvSpPr>
+          <p:cNvPr id="3" name="Content Placeholder 2"/>
+          <p:cNvSpPr>
+            <a:spLocks noGrp="1"/>
+          </p:cNvSpPr>
+          <p:nvPr>
+            <p:ph idx="1"/>
+          </p:nvPr>
+        </p:nvSpPr>
+        <p:spPr/>
+        <p:txBody>
+          <a:bodyPr/>
+          <a:lstStyle/>
+          <a:p>
+            <a:r>
               <a:rPr lang="en-US" dirty="0"/>
-              <a:t>Filtering on Priority,  Facility</a:t>
-            </a:r>
-          </a:p>
-        </p:txBody>
-      </p:sp>
-      <p:sp>
-        <p:nvSpPr>
-          <p:cNvPr id="3" name="Content Placeholder 2"/>
-          <p:cNvSpPr>
-            <a:spLocks noGrp="1"/>
-          </p:cNvSpPr>
-          <p:nvPr>
-            <p:ph idx="1"/>
-          </p:nvPr>
-        </p:nvSpPr>
-        <p:spPr/>
-        <p:txBody>
-          <a:bodyPr/>
-          <a:lstStyle/>
-          <a:p>
-            <a:pPr marL="342900" marR="0" lvl="0" indent="-342900" algn="l" defTabSz="914400" rtl="0" eaLnBrk="1" fontAlgn="auto" latinLnBrk="0" hangingPunct="1">
-              <a:lnSpc>
-                <a:spcPct val="100000"/>
-              </a:lnSpc>
-              <a:spcBef>
-                <a:spcPct val="20000"/>
-              </a:spcBef>
-              <a:spcAft>
-                <a:spcPts val="0"/>
-              </a:spcAft>
-              <a:buClrTx/>
-              <a:buSzTx/>
-              <a:buFont typeface="Arial" panose="020B0604020202020204" pitchFamily="34" charset="0"/>
-              <a:buChar char="•"/>
-              <a:tabLst/>
-              <a:defRPr/>
-            </a:pPr>
-            <a:r>
-              <a:rPr lang="en-US" sz="3200" kern="1200" dirty="0">
-                <a:solidFill>
-                  <a:schemeClr val="tx1"/>
-                </a:solidFill>
-                <a:effectLst/>
-                <a:latin typeface="+mn-lt"/>
-                <a:ea typeface="+mn-ea"/>
-                <a:cs typeface="+mn-cs"/>
-              </a:rPr>
-              <a:t>Filtering makes listings short and to the point, when needed</a:t>
-            </a:r>
+              <a:t>TRACE_LEVEL</a:t>
+            </a:r>
+            <a:r>
+              <a:rPr lang="en-US" baseline="0" dirty="0"/>
+              <a:t> environment variable</a:t>
+            </a:r>
+          </a:p>
+          <a:p>
+            <a:pPr lvl="1"/>
+            <a:r>
+              <a:rPr lang="en-US" dirty="0"/>
+              <a:t>1 for enter/exit function</a:t>
+            </a:r>
+          </a:p>
+          <a:p>
+            <a:pPr lvl="1"/>
+            <a:r>
+              <a:rPr lang="en-US" dirty="0"/>
+              <a:t>3</a:t>
+            </a:r>
+            <a:r>
+              <a:rPr lang="en-US" baseline="0" dirty="0"/>
+              <a:t> for most data details</a:t>
+            </a:r>
+          </a:p>
+          <a:p>
+            <a:pPr lvl="1"/>
+            <a:r>
+              <a:rPr lang="en-US" baseline="0" dirty="0"/>
+              <a:t>5 for excruciatingly detailed details</a:t>
+            </a:r>
+            <a:endParaRPr lang="en-US" dirty="0"/>
+          </a:p>
+          <a:p>
+            <a:pPr lvl="1"/>
+            <a:endParaRPr lang="en-US" baseline="0" dirty="0"/>
           </a:p>
           <a:p>
             <a:pPr lvl="0"/>
             <a:r>
-              <a:rPr lang="en-US" dirty="0" err="1"/>
-              <a:t>Envir</a:t>
-            </a:r>
-            <a:r>
-              <a:rPr lang="en-US" dirty="0"/>
-              <a:t> </a:t>
-            </a:r>
-            <a:r>
-              <a:rPr lang="en-US" dirty="0" err="1"/>
-              <a:t>vars</a:t>
-            </a:r>
-            <a:r>
-              <a:rPr lang="en-US" dirty="0"/>
-              <a:t> </a:t>
-            </a:r>
-          </a:p>
-          <a:p>
-            <a:pPr lvl="1"/>
-            <a:r>
-              <a:rPr lang="en-US" dirty="0"/>
-              <a:t>TRACE_LEVEL (</a:t>
-            </a:r>
-            <a:r>
-              <a:rPr lang="en-US" dirty="0" err="1"/>
-              <a:t>int</a:t>
-            </a:r>
-            <a:r>
-              <a:rPr lang="en-US" dirty="0"/>
-              <a:t>)</a:t>
-            </a:r>
-            <a:r>
-              <a:rPr lang="en-US" baseline="0" dirty="0"/>
-              <a:t> </a:t>
-            </a:r>
-          </a:p>
-          <a:p>
-            <a:pPr lvl="1"/>
-            <a:r>
-              <a:rPr lang="en-US" baseline="0" dirty="0"/>
-              <a:t>TRACE_FACIL (string)</a:t>
+              <a:rPr lang="en-US" sz="2400" b="1" dirty="0">
+                <a:solidFill>
+                  <a:srgbClr val="00B050"/>
+                </a:solidFill>
+                <a:latin typeface="Courier New" panose="02070309020205020404" pitchFamily="49" charset="0"/>
+                <a:cs typeface="Courier New" panose="02070309020205020404" pitchFamily="49" charset="0"/>
+              </a:rPr>
+              <a:t>export TRACE_LEVEL=3</a:t>
+            </a:r>
+            <a:br>
+              <a:rPr lang="en-US" sz="2400" b="1" dirty="0">
+                <a:solidFill>
+                  <a:srgbClr val="00B050"/>
+                </a:solidFill>
+                <a:latin typeface="Courier New" panose="02070309020205020404" pitchFamily="49" charset="0"/>
+                <a:cs typeface="Courier New" panose="02070309020205020404" pitchFamily="49" charset="0"/>
+              </a:rPr>
+            </a:br>
+            <a:r>
+              <a:rPr lang="en-US" sz="2400" b="1" dirty="0">
+                <a:solidFill>
+                  <a:srgbClr val="00B050"/>
+                </a:solidFill>
+                <a:latin typeface="Courier New" panose="02070309020205020404" pitchFamily="49" charset="0"/>
+                <a:cs typeface="Courier New" panose="02070309020205020404" pitchFamily="49" charset="0"/>
+              </a:rPr>
+              <a:t>python ...</a:t>
+            </a:r>
+            <a:br>
+              <a:rPr lang="en-US" sz="2400" b="1" dirty="0">
+                <a:solidFill>
+                  <a:srgbClr val="00B050"/>
+                </a:solidFill>
+                <a:latin typeface="Courier New" panose="02070309020205020404" pitchFamily="49" charset="0"/>
+                <a:cs typeface="Courier New" panose="02070309020205020404" pitchFamily="49" charset="0"/>
+              </a:rPr>
+            </a:br>
+            <a:r>
+              <a:rPr lang="en-US" sz="2400" b="1" dirty="0">
+                <a:solidFill>
+                  <a:srgbClr val="00B050"/>
+                </a:solidFill>
+                <a:latin typeface="Courier New" panose="02070309020205020404" pitchFamily="49" charset="0"/>
+                <a:cs typeface="Courier New" panose="02070309020205020404" pitchFamily="49" charset="0"/>
+              </a:rPr>
+              <a:t>unset TRACE_LEVEL</a:t>
             </a:r>
           </a:p>
         </p:txBody>
@@ -8116,7 +7971,7 @@
     </p:spTree>
     <p:extLst>
       <p:ext uri="{BB962C8B-B14F-4D97-AF65-F5344CB8AC3E}">
-        <p14:creationId xmlns:p14="http://schemas.microsoft.com/office/powerpoint/2010/main" val="2671257923"/>
+        <p14:creationId xmlns:p14="http://schemas.microsoft.com/office/powerpoint/2010/main" val="282780097"/>
       </p:ext>
     </p:extLst>
   </p:cSld>
@@ -8159,8 +8014,20 @@
           <a:lstStyle/>
           <a:p>
             <a:r>
+              <a:rPr lang="en-US" dirty="0"/>
+              <a:t>Filter</a:t>
+            </a:r>
+            <a:r>
               <a:rPr lang="en-US" baseline="0" dirty="0"/>
-              <a:t>Detail Levels I Use</a:t>
+              <a:t> by </a:t>
+            </a:r>
+            <a:r>
+              <a:rPr lang="en-US" dirty="0"/>
+              <a:t>Facility</a:t>
+            </a:r>
+            <a:r>
+              <a:rPr lang="en-US" baseline="0" dirty="0"/>
+              <a:t> Names</a:t>
             </a:r>
             <a:endParaRPr lang="en-US" dirty="0"/>
           </a:p>
@@ -8183,7 +8050,7 @@
           <a:p>
             <a:r>
               <a:rPr lang="en-US" dirty="0"/>
-              <a:t>TRACE_LEVEL</a:t>
+              <a:t>TRACE_FACIL</a:t>
             </a:r>
             <a:r>
               <a:rPr lang="en-US" baseline="0" dirty="0"/>
@@ -8193,35 +8060,70 @@
           <a:p>
             <a:pPr lvl="1"/>
             <a:r>
+              <a:rPr lang="en-US" baseline="0" dirty="0"/>
+              <a:t>Default</a:t>
+            </a:r>
+            <a:r>
               <a:rPr lang="en-US" dirty="0"/>
-              <a:t>1 for enter/exit function</a:t>
-            </a:r>
+              <a:t> = ALL</a:t>
+            </a:r>
+            <a:endParaRPr lang="en-US" baseline="0" dirty="0"/>
           </a:p>
           <a:p>
             <a:pPr lvl="1"/>
             <a:r>
+              <a:rPr lang="en-US" baseline="0" dirty="0"/>
+              <a:t>ALL, NONE,</a:t>
+            </a:r>
+            <a:r>
               <a:rPr lang="en-US" dirty="0"/>
-              <a:t>3</a:t>
-            </a:r>
-            <a:r>
-              <a:rPr lang="en-US" baseline="0" dirty="0"/>
-              <a:t> for most data details</a:t>
-            </a:r>
-          </a:p>
-          <a:p>
-            <a:pPr lvl="1"/>
-            <a:r>
-              <a:rPr lang="en-US" baseline="0" dirty="0"/>
-              <a:t>5 for excruciatingly detailed details</a:t>
-            </a:r>
+              <a:t> +, - </a:t>
+            </a:r>
+            <a:endParaRPr lang="en-US" baseline="0" dirty="0"/>
+          </a:p>
+          <a:p>
+            <a:pPr lvl="2"/>
+            <a:r>
+              <a:rPr lang="en-US" dirty="0"/>
+              <a:t>ALL-FOO-BAR</a:t>
+            </a:r>
+          </a:p>
+          <a:p>
+            <a:pPr lvl="2"/>
+            <a:r>
+              <a:rPr lang="en-US" dirty="0"/>
+              <a:t>NONE+FOO+BAR</a:t>
+            </a:r>
+          </a:p>
+          <a:p>
+            <a:pPr lvl="2"/>
+            <a:r>
+              <a:rPr lang="en-US" dirty="0"/>
+              <a:t>Unnamed trace lines always print</a:t>
+            </a:r>
+          </a:p>
+          <a:p>
+            <a:pPr lvl="2"/>
             <a:endParaRPr lang="en-US" dirty="0"/>
           </a:p>
           <a:p>
-            <a:pPr lvl="1"/>
-            <a:endParaRPr lang="en-US" baseline="0" dirty="0"/>
-          </a:p>
-          <a:p>
-            <a:pPr lvl="0"/>
+            <a:pPr marL="342900" marR="0" lvl="0" indent="-342900" algn="l" defTabSz="914400" rtl="0" eaLnBrk="1" fontAlgn="auto" latinLnBrk="0" hangingPunct="1">
+              <a:lnSpc>
+                <a:spcPct val="100000"/>
+              </a:lnSpc>
+              <a:spcBef>
+                <a:spcPct val="20000"/>
+              </a:spcBef>
+              <a:spcAft>
+                <a:spcPts val="0"/>
+              </a:spcAft>
+              <a:buClrTx/>
+              <a:buSzTx/>
+              <a:buFont typeface="Arial" panose="020B0604020202020204" pitchFamily="34" charset="0"/>
+              <a:buChar char="•"/>
+              <a:tabLst/>
+              <a:defRPr/>
+            </a:pPr>
             <a:r>
               <a:rPr lang="en-US" sz="2400" b="1" dirty="0">
                 <a:solidFill>
@@ -8230,7 +8132,7 @@
                 <a:latin typeface="Courier New" panose="02070309020205020404" pitchFamily="49" charset="0"/>
                 <a:cs typeface="Courier New" panose="02070309020205020404" pitchFamily="49" charset="0"/>
               </a:rPr>
-              <a:t>export TRACE_LEVEL=3</a:t>
+              <a:t>export TRACE_FACIL=NONE+FOO</a:t>
             </a:r>
             <a:br>
               <a:rPr lang="en-US" sz="2400" b="1" dirty="0">
@@ -8268,8 +8170,12 @@
                 <a:latin typeface="Courier New" panose="02070309020205020404" pitchFamily="49" charset="0"/>
                 <a:cs typeface="Courier New" panose="02070309020205020404" pitchFamily="49" charset="0"/>
               </a:rPr>
-              <a:t>unset TRACE_LEVEL</a:t>
-            </a:r>
+              <a:t>unset TRACE_FACIL</a:t>
+            </a:r>
+          </a:p>
+          <a:p>
+            <a:pPr lvl="0"/>
+            <a:endParaRPr lang="en-US" dirty="0"/>
           </a:p>
         </p:txBody>
       </p:sp>
@@ -8344,7 +8250,7 @@
     </p:spTree>
     <p:extLst>
       <p:ext uri="{BB962C8B-B14F-4D97-AF65-F5344CB8AC3E}">
-        <p14:creationId xmlns:p14="http://schemas.microsoft.com/office/powerpoint/2010/main" val="282780097"/>
+        <p14:creationId xmlns:p14="http://schemas.microsoft.com/office/powerpoint/2010/main" val="2837176964"/>
       </p:ext>
     </p:extLst>
   </p:cSld>
@@ -8383,171 +8289,71 @@
         </p:nvSpPr>
         <p:spPr/>
         <p:txBody>
-          <a:bodyPr/>
+          <a:bodyPr>
+            <a:normAutofit fontScale="90000"/>
+          </a:bodyPr>
           <a:lstStyle/>
           <a:p>
             <a:r>
               <a:rPr lang="en-US" dirty="0"/>
-              <a:t>Filter</a:t>
+              <a:t>Lesson: Identify Data,</a:t>
+            </a:r>
+            <a:br>
+              <a:rPr lang="en-US" dirty="0"/>
+            </a:br>
+            <a:r>
+              <a:rPr lang="en-US" dirty="0"/>
+              <a:t>Not</a:t>
             </a:r>
             <a:r>
               <a:rPr lang="en-US" baseline="0" dirty="0"/>
-              <a:t> by </a:t>
-            </a:r>
+              <a:t> Just Location</a:t>
+            </a:r>
+            <a:endParaRPr lang="en-US" dirty="0"/>
+          </a:p>
+        </p:txBody>
+      </p:sp>
+      <p:sp>
+        <p:nvSpPr>
+          <p:cNvPr id="3" name="Content Placeholder 2"/>
+          <p:cNvSpPr>
+            <a:spLocks noGrp="1"/>
+          </p:cNvSpPr>
+          <p:nvPr>
+            <p:ph idx="1"/>
+          </p:nvPr>
+        </p:nvSpPr>
+        <p:spPr/>
+        <p:txBody>
+          <a:bodyPr/>
+          <a:lstStyle/>
+          <a:p>
             <a:r>
               <a:rPr lang="en-US" dirty="0"/>
-              <a:t>Facility</a:t>
-            </a:r>
-            <a:r>
-              <a:rPr lang="en-US" baseline="0" dirty="0"/>
-              <a:t> Names</a:t>
-            </a:r>
-            <a:endParaRPr lang="en-US" dirty="0"/>
-          </a:p>
-        </p:txBody>
-      </p:sp>
-      <p:sp>
-        <p:nvSpPr>
-          <p:cNvPr id="3" name="Content Placeholder 2"/>
-          <p:cNvSpPr>
-            <a:spLocks noGrp="1"/>
-          </p:cNvSpPr>
-          <p:nvPr>
-            <p:ph idx="1"/>
-          </p:nvPr>
-        </p:nvSpPr>
-        <p:spPr/>
-        <p:txBody>
-          <a:bodyPr/>
-          <a:lstStyle/>
+              <a:t>Class instances look alike</a:t>
+            </a:r>
+          </a:p>
           <a:p>
             <a:r>
               <a:rPr lang="en-US" dirty="0"/>
-              <a:t>TRACE_FACIL</a:t>
-            </a:r>
-            <a:r>
-              <a:rPr lang="en-US" baseline="0" dirty="0"/>
-              <a:t> environment variable</a:t>
+              <a:t>Identifying instances by address or id()?  </a:t>
             </a:r>
           </a:p>
           <a:p>
             <a:pPr lvl="1"/>
             <a:r>
-              <a:rPr lang="en-US" baseline="0" dirty="0"/>
-              <a:t>Default</a:t>
-            </a:r>
-            <a:r>
               <a:rPr lang="en-US" dirty="0"/>
-              <a:t> = ALL</a:t>
-            </a:r>
-            <a:endParaRPr lang="en-US" baseline="0" dirty="0"/>
+              <a:t>Not useful to humans</a:t>
+            </a:r>
           </a:p>
           <a:p>
             <a:pPr lvl="1"/>
             <a:r>
-              <a:rPr lang="en-US" baseline="0" dirty="0"/>
-              <a:t>ALL, NONE,</a:t>
-            </a:r>
-            <a:r>
               <a:rPr lang="en-US" dirty="0"/>
-              <a:t> +, - </a:t>
-            </a:r>
-            <a:endParaRPr lang="en-US" baseline="0" dirty="0"/>
-          </a:p>
-          <a:p>
-            <a:pPr lvl="2"/>
-            <a:r>
-              <a:rPr lang="en-US" dirty="0"/>
-              <a:t>ALL-FOO-BAR</a:t>
-            </a:r>
-          </a:p>
-          <a:p>
-            <a:pPr lvl="2"/>
-            <a:r>
-              <a:rPr lang="en-US" dirty="0"/>
-              <a:t>NONE+FOO+BAR</a:t>
-            </a:r>
-          </a:p>
-          <a:p>
-            <a:pPr lvl="2"/>
-            <a:r>
-              <a:rPr lang="en-US" dirty="0"/>
-              <a:t>Unnamed trace lines always print</a:t>
-            </a:r>
-          </a:p>
-          <a:p>
-            <a:pPr lvl="2"/>
-            <a:endParaRPr lang="en-US" dirty="0"/>
-          </a:p>
-          <a:p>
-            <a:pPr marL="342900" marR="0" lvl="0" indent="-342900" algn="l" defTabSz="914400" rtl="0" eaLnBrk="1" fontAlgn="auto" latinLnBrk="0" hangingPunct="1">
-              <a:lnSpc>
-                <a:spcPct val="100000"/>
-              </a:lnSpc>
-              <a:spcBef>
-                <a:spcPct val="20000"/>
-              </a:spcBef>
-              <a:spcAft>
-                <a:spcPts val="0"/>
-              </a:spcAft>
-              <a:buClrTx/>
-              <a:buSzTx/>
-              <a:buFont typeface="Arial" panose="020B0604020202020204" pitchFamily="34" charset="0"/>
-              <a:buChar char="•"/>
-              <a:tabLst/>
-              <a:defRPr/>
-            </a:pPr>
-            <a:r>
-              <a:rPr lang="en-US" sz="2400" b="1" dirty="0">
-                <a:solidFill>
-                  <a:srgbClr val="00B050"/>
-                </a:solidFill>
-                <a:latin typeface="Courier New" panose="02070309020205020404" pitchFamily="49" charset="0"/>
-                <a:cs typeface="Courier New" panose="02070309020205020404" pitchFamily="49" charset="0"/>
-              </a:rPr>
-              <a:t>export TRACE_FACIL=NONE+FOO</a:t>
-            </a:r>
-            <a:br>
-              <a:rPr lang="en-US" sz="2400" b="1" dirty="0">
-                <a:solidFill>
-                  <a:srgbClr val="00B050"/>
-                </a:solidFill>
-                <a:latin typeface="Courier New" panose="02070309020205020404" pitchFamily="49" charset="0"/>
-                <a:cs typeface="Courier New" panose="02070309020205020404" pitchFamily="49" charset="0"/>
-              </a:rPr>
-            </a:br>
-            <a:r>
-              <a:rPr lang="en-US" sz="2400" b="1" dirty="0">
-                <a:solidFill>
-                  <a:srgbClr val="00B050"/>
-                </a:solidFill>
-                <a:latin typeface="Courier New" panose="02070309020205020404" pitchFamily="49" charset="0"/>
-                <a:cs typeface="Courier New" panose="02070309020205020404" pitchFamily="49" charset="0"/>
-              </a:rPr>
-              <a:t>python ...</a:t>
-            </a:r>
-            <a:br>
-              <a:rPr lang="en-US" sz="2400" b="1" dirty="0">
-                <a:solidFill>
-                  <a:srgbClr val="00B050"/>
-                </a:solidFill>
-                <a:latin typeface="Courier New" panose="02070309020205020404" pitchFamily="49" charset="0"/>
-                <a:cs typeface="Courier New" panose="02070309020205020404" pitchFamily="49" charset="0"/>
-              </a:rPr>
-            </a:br>
-            <a:r>
-              <a:rPr lang="en-US" sz="2400" b="1" dirty="0">
-                <a:solidFill>
-                  <a:srgbClr val="00B050"/>
-                </a:solidFill>
-                <a:latin typeface="Courier New" panose="02070309020205020404" pitchFamily="49" charset="0"/>
-                <a:cs typeface="Courier New" panose="02070309020205020404" pitchFamily="49" charset="0"/>
-              </a:rPr>
-              <a:t>unset TRACE_FACIL</a:t>
-            </a:r>
-          </a:p>
-          <a:p>
-            <a:pPr lvl="0"/>
+              <a:t>Solution: create names for instances</a:t>
+            </a:r>
+          </a:p>
+          <a:p>
             <a:endParaRPr lang="en-US" dirty="0"/>
           </a:p>
         </p:txBody>
@@ -8623,7 +8429,7 @@
     </p:spTree>
     <p:extLst>
       <p:ext uri="{BB962C8B-B14F-4D97-AF65-F5344CB8AC3E}">
-        <p14:creationId xmlns:p14="http://schemas.microsoft.com/office/powerpoint/2010/main" val="2837176964"/>
+        <p14:creationId xmlns:p14="http://schemas.microsoft.com/office/powerpoint/2010/main" val="3977547530"/>
       </p:ext>
     </p:extLst>
   </p:cSld>
@@ -8662,72 +8468,203 @@
         </p:nvSpPr>
         <p:spPr/>
         <p:txBody>
-          <a:bodyPr>
-            <a:normAutofit fontScale="90000"/>
-          </a:bodyPr>
+          <a:bodyPr/>
           <a:lstStyle/>
           <a:p>
             <a:r>
               <a:rPr lang="en-US" dirty="0"/>
-              <a:t>Lesson: Identify Data,</a:t>
-            </a:r>
-            <a:br>
+              <a:t>Map IDs to Instances</a:t>
+            </a:r>
+          </a:p>
+        </p:txBody>
+      </p:sp>
+      <p:sp>
+        <p:nvSpPr>
+          <p:cNvPr id="3" name="Content Placeholder 2"/>
+          <p:cNvSpPr>
+            <a:spLocks noGrp="1"/>
+          </p:cNvSpPr>
+          <p:nvPr>
+            <p:ph idx="1"/>
+          </p:nvPr>
+        </p:nvSpPr>
+        <p:spPr/>
+        <p:txBody>
+          <a:bodyPr/>
+          <a:lstStyle/>
+          <a:p>
+            <a:pPr lvl="0"/>
+            <a:r>
+              <a:rPr lang="en-US" sz="3200" kern="1200" dirty="0">
+                <a:solidFill>
+                  <a:schemeClr val="tx1"/>
+                </a:solidFill>
+                <a:effectLst/>
+                <a:latin typeface="+mn-lt"/>
+                <a:ea typeface="+mn-ea"/>
+                <a:cs typeface="+mn-cs"/>
+              </a:rPr>
+              <a:t>Store a unique ID in each instance</a:t>
+            </a:r>
+          </a:p>
+          <a:p>
+            <a:pPr lvl="1"/>
+            <a:r>
               <a:rPr lang="en-US" dirty="0"/>
-            </a:br>
+              <a:t>P</a:t>
+            </a:r>
+            <a:r>
+              <a:rPr lang="en-US" kern="1200" dirty="0">
+                <a:solidFill>
+                  <a:schemeClr val="tx1"/>
+                </a:solidFill>
+                <a:effectLst/>
+                <a:latin typeface="+mn-lt"/>
+                <a:ea typeface="+mn-ea"/>
+                <a:cs typeface="+mn-cs"/>
+              </a:rPr>
+              <a:t>ass ID strings</a:t>
+            </a:r>
             <a:r>
               <a:rPr lang="en-US" dirty="0"/>
-              <a:t>Not</a:t>
-            </a:r>
-            <a:r>
-              <a:rPr lang="en-US" baseline="0" dirty="0"/>
-              <a:t> Just Location</a:t>
-            </a:r>
-            <a:endParaRPr lang="en-US" dirty="0"/>
-          </a:p>
-        </p:txBody>
-      </p:sp>
-      <p:sp>
-        <p:nvSpPr>
-          <p:cNvPr id="3" name="Content Placeholder 2"/>
-          <p:cNvSpPr>
-            <a:spLocks noGrp="1"/>
-          </p:cNvSpPr>
-          <p:nvPr>
-            <p:ph idx="1"/>
-          </p:nvPr>
-        </p:nvSpPr>
-        <p:spPr/>
-        <p:txBody>
-          <a:bodyPr/>
-          <a:lstStyle/>
-          <a:p>
-            <a:r>
-              <a:rPr lang="en-US" dirty="0"/>
-              <a:t>Class instances look alike</a:t>
-            </a:r>
-          </a:p>
-          <a:p>
-            <a:r>
-              <a:rPr lang="en-US" dirty="0"/>
-              <a:t>Identifying instances by address or id()?  </a:t>
-            </a:r>
+              <a:t> in argument lists</a:t>
+            </a:r>
+          </a:p>
+          <a:p>
+            <a:pPr lvl="2"/>
+            <a:r>
+              <a:rPr lang="en-US" kern="1200">
+                <a:solidFill>
+                  <a:schemeClr val="tx1"/>
+                </a:solidFill>
+                <a:effectLst/>
+                <a:latin typeface="+mn-lt"/>
+                <a:ea typeface="+mn-ea"/>
+                <a:cs typeface="+mn-cs"/>
+              </a:rPr>
+              <a:t>Not </a:t>
+            </a:r>
+            <a:r>
+              <a:rPr lang="en-US" kern="1200" dirty="0">
+                <a:solidFill>
+                  <a:schemeClr val="tx1"/>
+                </a:solidFill>
+                <a:effectLst/>
+                <a:latin typeface="+mn-lt"/>
+                <a:ea typeface="+mn-ea"/>
+                <a:cs typeface="+mn-cs"/>
+              </a:rPr>
+              <a:t>just </a:t>
+            </a:r>
+            <a:r>
+              <a:rPr lang="en-US" kern="1200" baseline="0" dirty="0">
+                <a:solidFill>
+                  <a:schemeClr val="tx1"/>
+                </a:solidFill>
+                <a:effectLst/>
+                <a:latin typeface="+mn-lt"/>
+                <a:ea typeface="+mn-ea"/>
+                <a:cs typeface="+mn-cs"/>
+              </a:rPr>
+              <a:t>instances (</a:t>
+            </a:r>
+            <a:r>
+              <a:rPr lang="en-US" kern="1200" baseline="0">
+                <a:solidFill>
+                  <a:schemeClr val="tx1"/>
+                </a:solidFill>
+                <a:effectLst/>
+                <a:latin typeface="+mn-lt"/>
+                <a:ea typeface="+mn-ea"/>
+                <a:cs typeface="+mn-cs"/>
+              </a:rPr>
+              <a:t>addresses)</a:t>
+            </a:r>
+            <a:endParaRPr lang="en-US" kern="1200" dirty="0">
+              <a:solidFill>
+                <a:schemeClr val="tx1"/>
+              </a:solidFill>
+              <a:effectLst/>
+              <a:latin typeface="+mn-lt"/>
+              <a:ea typeface="+mn-ea"/>
+              <a:cs typeface="+mn-cs"/>
+            </a:endParaRPr>
           </a:p>
           <a:p>
             <a:pPr lvl="1"/>
             <a:r>
-              <a:rPr lang="en-US" dirty="0"/>
-              <a:t>Not useful to humans</a:t>
-            </a:r>
-          </a:p>
-          <a:p>
-            <a:pPr lvl="1"/>
-            <a:r>
-              <a:rPr lang="en-US" dirty="0"/>
-              <a:t>Solution: create names for instances</a:t>
-            </a:r>
-          </a:p>
-          <a:p>
-            <a:endParaRPr lang="en-US" dirty="0"/>
+              <a:rPr lang="en-US" kern="1200" dirty="0">
+                <a:solidFill>
+                  <a:schemeClr val="tx1"/>
+                </a:solidFill>
+                <a:effectLst/>
+                <a:latin typeface="+mn-lt"/>
+                <a:ea typeface="+mn-ea"/>
+                <a:cs typeface="+mn-cs"/>
+              </a:rPr>
+              <a:t>Use dictionaries to map from (class and) ID-string</a:t>
+            </a:r>
+            <a:r>
+              <a:rPr lang="en-US" kern="1200" baseline="0" dirty="0">
+                <a:solidFill>
+                  <a:schemeClr val="tx1"/>
+                </a:solidFill>
+                <a:effectLst/>
+                <a:latin typeface="+mn-lt"/>
+                <a:ea typeface="+mn-ea"/>
+                <a:cs typeface="+mn-cs"/>
+              </a:rPr>
+              <a:t> </a:t>
+            </a:r>
+            <a:r>
+              <a:rPr lang="en-US" kern="1200" dirty="0">
+                <a:solidFill>
+                  <a:schemeClr val="tx1"/>
+                </a:solidFill>
+                <a:effectLst/>
+                <a:latin typeface="+mn-lt"/>
+                <a:ea typeface="+mn-ea"/>
+                <a:cs typeface="+mn-cs"/>
+              </a:rPr>
+              <a:t>to instance</a:t>
+            </a:r>
+          </a:p>
+          <a:p>
+            <a:pPr lvl="2"/>
+            <a:r>
+              <a:rPr lang="en-US" kern="1200" dirty="0">
+                <a:solidFill>
+                  <a:schemeClr val="tx1"/>
+                </a:solidFill>
+                <a:effectLst/>
+                <a:latin typeface="+mn-lt"/>
+                <a:ea typeface="+mn-ea"/>
+                <a:cs typeface="+mn-cs"/>
+              </a:rPr>
+              <a:t>Dictionary lookup is cheap</a:t>
+            </a:r>
+          </a:p>
+          <a:p>
+            <a:pPr lvl="2"/>
+            <a:endParaRPr lang="en-US" kern="1200" dirty="0">
+              <a:solidFill>
+                <a:schemeClr val="tx1"/>
+              </a:solidFill>
+              <a:effectLst/>
+              <a:latin typeface="+mn-lt"/>
+              <a:ea typeface="+mn-ea"/>
+              <a:cs typeface="+mn-cs"/>
+            </a:endParaRPr>
+          </a:p>
+          <a:p>
+            <a:r>
+              <a:rPr lang="en-US" sz="2400" b="1" dirty="0">
+                <a:solidFill>
+                  <a:srgbClr val="00B050"/>
+                </a:solidFill>
+              </a:rPr>
+              <a:t>&lt;code: instance identifiers&gt;</a:t>
+            </a:r>
           </a:p>
         </p:txBody>
       </p:sp>
@@ -8802,7 +8739,7 @@
     </p:spTree>
     <p:extLst>
       <p:ext uri="{BB962C8B-B14F-4D97-AF65-F5344CB8AC3E}">
-        <p14:creationId xmlns:p14="http://schemas.microsoft.com/office/powerpoint/2010/main" val="3977547530"/>
+        <p14:creationId xmlns:p14="http://schemas.microsoft.com/office/powerpoint/2010/main" val="2515492778"/>
       </p:ext>
     </p:extLst>
   </p:cSld>
@@ -8846,7 +8783,7 @@
           <a:p>
             <a:r>
               <a:rPr lang="en-US" dirty="0"/>
-              <a:t>Map IDs to Instances</a:t>
+              <a:t>Contact</a:t>
             </a:r>
           </a:p>
         </p:txBody>
@@ -8866,178 +8803,29 @@
           <a:bodyPr/>
           <a:lstStyle/>
           <a:p>
-            <a:pPr lvl="0"/>
-            <a:r>
-              <a:rPr lang="en-US" sz="3200" kern="1200" dirty="0">
-                <a:solidFill>
-                  <a:schemeClr val="tx1"/>
-                </a:solidFill>
-                <a:effectLst/>
-                <a:latin typeface="+mn-lt"/>
-                <a:ea typeface="+mn-ea"/>
-                <a:cs typeface="+mn-cs"/>
-              </a:rPr>
-              <a:t>Store a unique ID in each instance</a:t>
-            </a:r>
-          </a:p>
-          <a:p>
-            <a:pPr lvl="1"/>
             <a:r>
               <a:rPr lang="en-US" dirty="0"/>
-              <a:t>P</a:t>
-            </a:r>
-            <a:r>
-              <a:rPr lang="en-US" kern="1200" dirty="0">
-                <a:solidFill>
-                  <a:schemeClr val="tx1"/>
-                </a:solidFill>
-                <a:effectLst/>
-                <a:latin typeface="+mn-lt"/>
-                <a:ea typeface="+mn-ea"/>
-                <a:cs typeface="+mn-cs"/>
-              </a:rPr>
-              <a:t>ass ID strings</a:t>
-            </a:r>
+              <a:t>www.github.com/rblandau/NewTrace</a:t>
+            </a:r>
+          </a:p>
+          <a:p>
+            <a:endParaRPr lang="en-US" dirty="0"/>
+          </a:p>
+          <a:p>
             <a:r>
               <a:rPr lang="en-US" dirty="0"/>
-              <a:t> in argument lists</a:t>
-            </a:r>
-          </a:p>
-          <a:p>
-            <a:pPr lvl="2"/>
-            <a:r>
-              <a:rPr lang="en-US" kern="1200">
-                <a:solidFill>
-                  <a:schemeClr val="tx1"/>
-                </a:solidFill>
-                <a:effectLst/>
-                <a:latin typeface="+mn-lt"/>
-                <a:ea typeface="+mn-ea"/>
-                <a:cs typeface="+mn-cs"/>
-              </a:rPr>
-              <a:t>Not </a:t>
-            </a:r>
-            <a:r>
-              <a:rPr lang="en-US" kern="1200" dirty="0">
-                <a:solidFill>
-                  <a:schemeClr val="tx1"/>
-                </a:solidFill>
-                <a:effectLst/>
-                <a:latin typeface="+mn-lt"/>
-                <a:ea typeface="+mn-ea"/>
-                <a:cs typeface="+mn-cs"/>
-              </a:rPr>
-              <a:t>just </a:t>
-            </a:r>
-            <a:r>
-              <a:rPr lang="en-US" kern="1200" baseline="0" dirty="0">
-                <a:solidFill>
-                  <a:schemeClr val="tx1"/>
-                </a:solidFill>
-                <a:effectLst/>
-                <a:latin typeface="+mn-lt"/>
-                <a:ea typeface="+mn-ea"/>
-                <a:cs typeface="+mn-cs"/>
-              </a:rPr>
-              <a:t>instances (</a:t>
-            </a:r>
-            <a:r>
-              <a:rPr lang="en-US" kern="1200" baseline="0">
-                <a:solidFill>
-                  <a:schemeClr val="tx1"/>
-                </a:solidFill>
-                <a:effectLst/>
-                <a:latin typeface="+mn-lt"/>
-                <a:ea typeface="+mn-ea"/>
-                <a:cs typeface="+mn-cs"/>
-              </a:rPr>
-              <a:t>addresses)</a:t>
-            </a:r>
-            <a:endParaRPr lang="en-US" kern="1200" dirty="0">
-              <a:solidFill>
-                <a:schemeClr val="tx1"/>
-              </a:solidFill>
-              <a:effectLst/>
-              <a:latin typeface="+mn-lt"/>
-              <a:ea typeface="+mn-ea"/>
-              <a:cs typeface="+mn-cs"/>
-            </a:endParaRPr>
-          </a:p>
-          <a:p>
-            <a:pPr lvl="1"/>
-            <a:r>
-              <a:rPr lang="en-US" kern="1200" dirty="0">
-                <a:solidFill>
-                  <a:schemeClr val="tx1"/>
-                </a:solidFill>
-                <a:effectLst/>
-                <a:latin typeface="+mn-lt"/>
-                <a:ea typeface="+mn-ea"/>
-                <a:cs typeface="+mn-cs"/>
-              </a:rPr>
-              <a:t>Use dictionaries to map from (class and) ID-string</a:t>
-            </a:r>
-            <a:r>
-              <a:rPr lang="en-US" kern="1200" baseline="0" dirty="0">
-                <a:solidFill>
-                  <a:schemeClr val="tx1"/>
-                </a:solidFill>
-                <a:effectLst/>
-                <a:latin typeface="+mn-lt"/>
-                <a:ea typeface="+mn-ea"/>
-                <a:cs typeface="+mn-cs"/>
-              </a:rPr>
-              <a:t> </a:t>
-            </a:r>
-            <a:r>
-              <a:rPr lang="en-US" kern="1200" dirty="0">
-                <a:solidFill>
-                  <a:schemeClr val="tx1"/>
-                </a:solidFill>
-                <a:effectLst/>
-                <a:latin typeface="+mn-lt"/>
-                <a:ea typeface="+mn-ea"/>
-                <a:cs typeface="+mn-cs"/>
-              </a:rPr>
-              <a:t>to instance</a:t>
-            </a:r>
-          </a:p>
-          <a:p>
-            <a:pPr lvl="2"/>
-            <a:r>
-              <a:rPr lang="en-US" kern="1200" dirty="0">
-                <a:solidFill>
-                  <a:schemeClr val="tx1"/>
-                </a:solidFill>
-                <a:effectLst/>
-                <a:latin typeface="+mn-lt"/>
-                <a:ea typeface="+mn-ea"/>
-                <a:cs typeface="+mn-cs"/>
-              </a:rPr>
-              <a:t>Dictionary lookup is cheap</a:t>
-            </a:r>
-          </a:p>
-          <a:p>
-            <a:pPr lvl="2"/>
-            <a:endParaRPr lang="en-US" kern="1200" dirty="0">
-              <a:solidFill>
-                <a:schemeClr val="tx1"/>
-              </a:solidFill>
-              <a:effectLst/>
-              <a:latin typeface="+mn-lt"/>
-              <a:ea typeface="+mn-ea"/>
-              <a:cs typeface="+mn-cs"/>
-            </a:endParaRPr>
-          </a:p>
-          <a:p>
-            <a:r>
-              <a:rPr lang="en-US" sz="2400" b="1" dirty="0">
-                <a:solidFill>
-                  <a:srgbClr val="00B050"/>
-                </a:solidFill>
-              </a:rPr>
-              <a:t>&lt;code: instance identifiers&gt;</a:t>
-            </a:r>
+              <a:t>email: </a:t>
+            </a:r>
+            <a:r>
+              <a:rPr lang="en-US" dirty="0">
+                <a:hlinkClick r:id="rId2"/>
+              </a:rPr>
+              <a:t>landau@ricksoft.com</a:t>
+            </a:r>
+            <a:endParaRPr lang="en-US" dirty="0"/>
+          </a:p>
+          <a:p>
+            <a:endParaRPr lang="en-US" dirty="0"/>
           </a:p>
         </p:txBody>
       </p:sp>
@@ -9112,7 +8900,7 @@
     </p:spTree>
     <p:extLst>
       <p:ext uri="{BB962C8B-B14F-4D97-AF65-F5344CB8AC3E}">
-        <p14:creationId xmlns:p14="http://schemas.microsoft.com/office/powerpoint/2010/main" val="2515492778"/>
+        <p14:creationId xmlns:p14="http://schemas.microsoft.com/office/powerpoint/2010/main" val="2919167354"/>
       </p:ext>
     </p:extLst>
   </p:cSld>
@@ -9359,7 +9147,7 @@
           <a:p>
             <a:r>
               <a:rPr lang="en-US" dirty="0"/>
-              <a:t>Contact</a:t>
+              <a:t>Other Tidbits</a:t>
             </a:r>
           </a:p>
         </p:txBody>
@@ -9379,29 +9167,7 @@
           <a:bodyPr/>
           <a:lstStyle/>
           <a:p>
-            <a:r>
-              <a:rPr lang="en-US" dirty="0"/>
-              <a:t>www.github.com/rblandau/NewTrace</a:t>
-            </a:r>
-          </a:p>
-          <a:p>
-            <a:endParaRPr lang="en-US" dirty="0"/>
-          </a:p>
-          <a:p>
-            <a:r>
-              <a:rPr lang="en-US" dirty="0"/>
-              <a:t>email: </a:t>
-            </a:r>
-            <a:r>
-              <a:rPr lang="en-US" dirty="0">
-                <a:hlinkClick r:id="rId2"/>
-              </a:rPr>
-              <a:t>landau@ricksoft.com</a:t>
-            </a:r>
-            <a:endParaRPr lang="en-US" dirty="0"/>
-          </a:p>
-          <a:p>
-            <a:endParaRPr lang="en-US" dirty="0"/>
+            <a:endParaRPr lang="en-US"/>
           </a:p>
         </p:txBody>
       </p:sp>
@@ -9476,7 +9242,7 @@
     </p:spTree>
     <p:extLst>
       <p:ext uri="{BB962C8B-B14F-4D97-AF65-F5344CB8AC3E}">
-        <p14:creationId xmlns:p14="http://schemas.microsoft.com/office/powerpoint/2010/main" val="2919167354"/>
+        <p14:creationId xmlns:p14="http://schemas.microsoft.com/office/powerpoint/2010/main" val="3139874563"/>
       </p:ext>
     </p:extLst>
   </p:cSld>
@@ -9520,8 +9286,13 @@
           <a:p>
             <a:r>
               <a:rPr lang="en-US" dirty="0"/>
-              <a:t>Other Tidbits</a:t>
-            </a:r>
+              <a:t>Use</a:t>
+            </a:r>
+            <a:r>
+              <a:rPr lang="en-US" baseline="0" dirty="0"/>
+              <a:t> for Regression Testing</a:t>
+            </a:r>
+            <a:endParaRPr lang="en-US" dirty="0"/>
           </a:p>
         </p:txBody>
       </p:sp>
@@ -9540,7 +9311,62 @@
           <a:bodyPr/>
           <a:lstStyle/>
           <a:p>
-            <a:endParaRPr lang="en-US"/>
+            <a:r>
+              <a:rPr lang="en-US" sz="3200" kern="1200" dirty="0">
+                <a:solidFill>
+                  <a:schemeClr val="tx1"/>
+                </a:solidFill>
+                <a:effectLst/>
+                <a:latin typeface="+mn-lt"/>
+                <a:ea typeface="+mn-ea"/>
+                <a:cs typeface="+mn-cs"/>
+              </a:rPr>
+              <a:t>Tests can be done with log files suitably sanitized</a:t>
+            </a:r>
+          </a:p>
+          <a:p>
+            <a:pPr lvl="1"/>
+            <a:r>
+              <a:rPr lang="en-US" sz="2800" kern="1200" dirty="0">
+                <a:solidFill>
+                  <a:schemeClr val="tx1"/>
+                </a:solidFill>
+                <a:effectLst/>
+                <a:latin typeface="+mn-lt"/>
+                <a:ea typeface="+mn-ea"/>
+                <a:cs typeface="+mn-cs"/>
+              </a:rPr>
+              <a:t>Timestamps and other non-deterministic items</a:t>
+            </a:r>
+          </a:p>
+          <a:p>
+            <a:pPr lvl="1"/>
+            <a:r>
+              <a:rPr lang="en-US" sz="2800" kern="1200" dirty="0">
+                <a:solidFill>
+                  <a:schemeClr val="tx1"/>
+                </a:solidFill>
+                <a:effectLst/>
+                <a:latin typeface="+mn-lt"/>
+                <a:ea typeface="+mn-ea"/>
+                <a:cs typeface="+mn-cs"/>
+              </a:rPr>
+              <a:t>(Ordering tricky if multi-threaded or multiprocessing)</a:t>
+            </a:r>
+          </a:p>
+          <a:p>
+            <a:r>
+              <a:rPr lang="en-US" sz="3200" kern="1200" dirty="0">
+                <a:solidFill>
+                  <a:schemeClr val="tx1"/>
+                </a:solidFill>
+                <a:effectLst/>
+                <a:latin typeface="+mn-lt"/>
+                <a:ea typeface="+mn-ea"/>
+                <a:cs typeface="+mn-cs"/>
+              </a:rPr>
+              <a:t>Possible with trace files in some cases</a:t>
+            </a:r>
           </a:p>
         </p:txBody>
       </p:sp>
@@ -9615,7 +9441,7 @@
     </p:spTree>
     <p:extLst>
       <p:ext uri="{BB962C8B-B14F-4D97-AF65-F5344CB8AC3E}">
-        <p14:creationId xmlns:p14="http://schemas.microsoft.com/office/powerpoint/2010/main" val="3139874563"/>
+        <p14:creationId xmlns:p14="http://schemas.microsoft.com/office/powerpoint/2010/main" val="3691605327"/>
       </p:ext>
     </p:extLst>
   </p:cSld>
@@ -9659,13 +9485,8 @@
           <a:p>
             <a:r>
               <a:rPr lang="en-US" dirty="0"/>
-              <a:t>Use</a:t>
-            </a:r>
-            <a:r>
-              <a:rPr lang="en-US" baseline="0" dirty="0"/>
-              <a:t> for Regression Testing</a:t>
-            </a:r>
-            <a:endParaRPr lang="en-US" dirty="0"/>
+              <a:t>Python trace Module?</a:t>
+            </a:r>
           </a:p>
         </p:txBody>
       </p:sp>
@@ -9684,6 +9505,7 @@
           <a:bodyPr/>
           <a:lstStyle/>
           <a:p>
+            <a:pPr lvl="0"/>
             <a:r>
               <a:rPr lang="en-US" sz="3200" kern="1200" dirty="0">
                 <a:solidFill>
@@ -9694,7 +9516,7 @@
                 <a:ea typeface="+mn-ea"/>
                 <a:cs typeface="+mn-cs"/>
               </a:rPr>
-              <a:t>Tests can be done with log files suitably sanitized</a:t>
+              <a:t>The standard Python trace module doesn't fit my needs</a:t>
             </a:r>
           </a:p>
           <a:p>
@@ -9709,13 +9531,10 @@
                 <a:ea typeface="+mn-ea"/>
                 <a:cs typeface="+mn-cs"/>
               </a:rPr>
-              <a:t>Timestamps and other non-deterministic items</a:t>
-            </a:r>
-          </a:p>
-          <a:p>
-            <a:pPr lvl="1"/>
-            <a:r>
-              <a:rPr lang="en-US" sz="2800" kern="1200" dirty="0">
+              <a:t>Tracks</a:t>
+            </a:r>
+            <a:r>
+              <a:rPr lang="en-US" sz="2800" kern="1200" baseline="0" dirty="0">
                 <a:solidFill>
                   <a:schemeClr val="tx1"/>
                 </a:solidFill>
@@ -9724,12 +9543,10 @@
                 <a:ea typeface="+mn-ea"/>
                 <a:cs typeface="+mn-cs"/>
               </a:rPr>
-              <a:t>(Ordering tricky if multi-threaded or multiprocessing)</a:t>
-            </a:r>
-          </a:p>
-          <a:p>
-            <a:r>
-              <a:rPr lang="en-US" sz="3200" kern="1200" dirty="0">
+              <a:t> </a:t>
+            </a:r>
+            <a:r>
+              <a:rPr lang="en-US" sz="2800" kern="1200" dirty="0">
                 <a:solidFill>
                   <a:schemeClr val="tx1"/>
                 </a:solidFill>
@@ -9738,7 +9555,7 @@
                 <a:ea typeface="+mn-ea"/>
                 <a:cs typeface="+mn-cs"/>
               </a:rPr>
-              <a:t>Possible with trace files in some cases</a:t>
+              <a:t>process, sequence of statements</a:t>
             </a:r>
           </a:p>
         </p:txBody>
@@ -9814,7 +9631,7 @@
     </p:spTree>
     <p:extLst>
       <p:ext uri="{BB962C8B-B14F-4D97-AF65-F5344CB8AC3E}">
-        <p14:creationId xmlns:p14="http://schemas.microsoft.com/office/powerpoint/2010/main" val="3691605327"/>
+        <p14:creationId xmlns:p14="http://schemas.microsoft.com/office/powerpoint/2010/main" val="227939493"/>
       </p:ext>
     </p:extLst>
   </p:cSld>
@@ -9858,7 +9675,7 @@
           <a:p>
             <a:r>
               <a:rPr lang="en-US" dirty="0"/>
-              <a:t>Python trace Module?</a:t>
+              <a:t>Multiprocessing</a:t>
             </a:r>
           </a:p>
         </p:txBody>
@@ -9878,7 +9695,23 @@
           <a:bodyPr/>
           <a:lstStyle/>
           <a:p>
-            <a:pPr lvl="0"/>
+            <a:pPr marL="342900" marR="0" lvl="0" indent="-342900" algn="l" defTabSz="914400" rtl="0" eaLnBrk="1" fontAlgn="auto" latinLnBrk="0" hangingPunct="1">
+              <a:lnSpc>
+                <a:spcPct val="100000"/>
+              </a:lnSpc>
+              <a:spcBef>
+                <a:spcPct val="20000"/>
+              </a:spcBef>
+              <a:spcAft>
+                <a:spcPts val="0"/>
+              </a:spcAft>
+              <a:buClrTx/>
+              <a:buSzTx/>
+              <a:buFont typeface="Arial" panose="020B0604020202020204" pitchFamily="34" charset="0"/>
+              <a:buChar char="•"/>
+              <a:tabLst/>
+              <a:defRPr/>
+            </a:pPr>
             <a:r>
               <a:rPr lang="en-US" sz="3200" kern="1200" dirty="0">
                 <a:solidFill>
@@ -9889,46 +9722,13 @@
                 <a:ea typeface="+mn-ea"/>
                 <a:cs typeface="+mn-cs"/>
               </a:rPr>
-              <a:t>The standard Python trace module doesn't fit my needs</a:t>
-            </a:r>
-          </a:p>
-          <a:p>
-            <a:pPr lvl="1"/>
-            <a:r>
-              <a:rPr lang="en-US" sz="2800" kern="1200" dirty="0">
-                <a:solidFill>
-                  <a:schemeClr val="tx1"/>
-                </a:solidFill>
-                <a:effectLst/>
-                <a:latin typeface="+mn-lt"/>
-                <a:ea typeface="+mn-ea"/>
-                <a:cs typeface="+mn-cs"/>
-              </a:rPr>
-              <a:t>Tracks</a:t>
-            </a:r>
-            <a:r>
-              <a:rPr lang="en-US" sz="2800" kern="1200" baseline="0" dirty="0">
-                <a:solidFill>
-                  <a:schemeClr val="tx1"/>
-                </a:solidFill>
-                <a:effectLst/>
-                <a:latin typeface="+mn-lt"/>
-                <a:ea typeface="+mn-ea"/>
-                <a:cs typeface="+mn-cs"/>
-              </a:rPr>
-              <a:t> </a:t>
-            </a:r>
-            <a:r>
-              <a:rPr lang="en-US" sz="2800" kern="1200" dirty="0">
-                <a:solidFill>
-                  <a:schemeClr val="tx1"/>
-                </a:solidFill>
-                <a:effectLst/>
-                <a:latin typeface="+mn-lt"/>
-                <a:ea typeface="+mn-ea"/>
-                <a:cs typeface="+mn-cs"/>
-              </a:rPr>
-              <a:t>process, sequence of statements</a:t>
+              <a:t>Multiprocessor-safe, or at least thread-safe, would be good</a:t>
+            </a:r>
+          </a:p>
+          <a:p>
+            <a:r>
+              <a:rPr lang="en-US" dirty="0"/>
+              <a:t>Not yet</a:t>
             </a:r>
           </a:p>
         </p:txBody>
@@ -10004,7 +9804,7 @@
     </p:spTree>
     <p:extLst>
       <p:ext uri="{BB962C8B-B14F-4D97-AF65-F5344CB8AC3E}">
-        <p14:creationId xmlns:p14="http://schemas.microsoft.com/office/powerpoint/2010/main" val="227939493"/>
+        <p14:creationId xmlns:p14="http://schemas.microsoft.com/office/powerpoint/2010/main" val="400251234"/>
       </p:ext>
     </p:extLst>
   </p:cSld>
@@ -10048,8 +9848,13 @@
           <a:p>
             <a:r>
               <a:rPr lang="en-US" dirty="0"/>
-              <a:t>Multiprocessing</a:t>
-            </a:r>
+              <a:t>Use Meaningful</a:t>
+            </a:r>
+            <a:r>
+              <a:rPr lang="en-US" baseline="0" dirty="0"/>
+              <a:t> Names</a:t>
+            </a:r>
+            <a:endParaRPr lang="en-US" dirty="0"/>
           </a:p>
         </p:txBody>
       </p:sp>
@@ -10065,26 +9870,12 @@
         </p:nvSpPr>
         <p:spPr/>
         <p:txBody>
-          <a:bodyPr/>
-          <a:lstStyle/>
-          <a:p>
-            <a:pPr marL="342900" marR="0" lvl="0" indent="-342900" algn="l" defTabSz="914400" rtl="0" eaLnBrk="1" fontAlgn="auto" latinLnBrk="0" hangingPunct="1">
-              <a:lnSpc>
-                <a:spcPct val="100000"/>
-              </a:lnSpc>
-              <a:spcBef>
-                <a:spcPct val="20000"/>
-              </a:spcBef>
-              <a:spcAft>
-                <a:spcPts val="0"/>
-              </a:spcAft>
-              <a:buClrTx/>
-              <a:buSzTx/>
-              <a:buFont typeface="Arial" panose="020B0604020202020204" pitchFamily="34" charset="0"/>
-              <a:buChar char="•"/>
-              <a:tabLst/>
-              <a:defRPr/>
-            </a:pPr>
+          <a:bodyPr>
+            <a:normAutofit/>
+          </a:bodyPr>
+          <a:lstStyle/>
+          <a:p>
+            <a:pPr lvl="0"/>
             <a:r>
               <a:rPr lang="en-US" sz="3200" kern="1200" dirty="0">
                 <a:solidFill>
@@ -10095,13 +9886,106 @@
                 <a:ea typeface="+mn-ea"/>
                 <a:cs typeface="+mn-cs"/>
               </a:rPr>
-              <a:t>Multiprocessor-safe, or at least thread-safe, would be good</a:t>
-            </a:r>
-          </a:p>
-          <a:p>
-            <a:r>
-              <a:rPr lang="en-US" dirty="0"/>
-              <a:t>Not yet</a:t>
+              <a:t>The type of the data should be obvious</a:t>
+            </a:r>
+          </a:p>
+          <a:p>
+            <a:pPr lvl="1"/>
+            <a:r>
+              <a:rPr lang="en-US" sz="2800" kern="1200" dirty="0">
+                <a:solidFill>
+                  <a:schemeClr val="tx1"/>
+                </a:solidFill>
+                <a:effectLst/>
+                <a:latin typeface="+mn-lt"/>
+                <a:ea typeface="+mn-ea"/>
+                <a:cs typeface="+mn-cs"/>
+              </a:rPr>
+              <a:t>It prevents a lot of runtime errors</a:t>
+            </a:r>
+          </a:p>
+          <a:p>
+            <a:pPr lvl="0"/>
+            <a:r>
+              <a:rPr lang="en-US" sz="3200" kern="1200" dirty="0">
+                <a:solidFill>
+                  <a:schemeClr val="tx1"/>
+                </a:solidFill>
+                <a:effectLst/>
+                <a:latin typeface="+mn-lt"/>
+                <a:ea typeface="+mn-ea"/>
+                <a:cs typeface="+mn-cs"/>
+              </a:rPr>
+              <a:t>I use "Hungarian naming" because (dinosaur!) I grew up with it</a:t>
+            </a:r>
+          </a:p>
+          <a:p>
+            <a:pPr lvl="1"/>
+            <a:r>
+              <a:rPr lang="en-US" sz="2800" kern="1200" dirty="0" err="1">
+                <a:solidFill>
+                  <a:schemeClr val="tx1"/>
+                </a:solidFill>
+                <a:effectLst/>
+                <a:latin typeface="+mn-lt"/>
+                <a:ea typeface="+mn-ea"/>
+                <a:cs typeface="+mn-cs"/>
+              </a:rPr>
+              <a:t>CamelCase</a:t>
+            </a:r>
+            <a:r>
+              <a:rPr lang="en-US" sz="2800" kern="1200" dirty="0">
+                <a:solidFill>
+                  <a:schemeClr val="tx1"/>
+                </a:solidFill>
+                <a:effectLst/>
+                <a:latin typeface="+mn-lt"/>
+                <a:ea typeface="+mn-ea"/>
+                <a:cs typeface="+mn-cs"/>
+              </a:rPr>
+              <a:t> with ugly prefixes for datatypes </a:t>
+            </a:r>
+          </a:p>
+          <a:p>
+            <a:pPr lvl="1"/>
+            <a:r>
+              <a:rPr lang="en-US" sz="2800" kern="1200" dirty="0" err="1">
+                <a:solidFill>
+                  <a:schemeClr val="tx1"/>
+                </a:solidFill>
+                <a:effectLst/>
+                <a:latin typeface="+mn-lt"/>
+                <a:ea typeface="+mn-ea"/>
+                <a:cs typeface="+mn-cs"/>
+              </a:rPr>
+              <a:t>CamelCase</a:t>
+            </a:r>
+            <a:r>
+              <a:rPr lang="en-US" sz="2800" kern="1200" dirty="0">
+                <a:solidFill>
+                  <a:schemeClr val="tx1"/>
+                </a:solidFill>
+                <a:effectLst/>
+                <a:latin typeface="+mn-lt"/>
+                <a:ea typeface="+mn-ea"/>
+                <a:cs typeface="+mn-cs"/>
+              </a:rPr>
+              <a:t> is just a personal preference BUT</a:t>
+            </a:r>
+          </a:p>
+          <a:p>
+            <a:pPr lvl="1"/>
+            <a:r>
+              <a:rPr lang="en-US" sz="2800" kern="1200" dirty="0">
+                <a:solidFill>
+                  <a:schemeClr val="tx1"/>
+                </a:solidFill>
+                <a:effectLst/>
+                <a:latin typeface="+mn-lt"/>
+                <a:ea typeface="+mn-ea"/>
+                <a:cs typeface="+mn-cs"/>
+              </a:rPr>
+              <a:t>Datatype at the beginning of the name of data (or a function) is useful</a:t>
             </a:r>
           </a:p>
         </p:txBody>
@@ -10177,7 +10061,7 @@
     </p:spTree>
     <p:extLst>
       <p:ext uri="{BB962C8B-B14F-4D97-AF65-F5344CB8AC3E}">
-        <p14:creationId xmlns:p14="http://schemas.microsoft.com/office/powerpoint/2010/main" val="400251234"/>
+        <p14:creationId xmlns:p14="http://schemas.microsoft.com/office/powerpoint/2010/main" val="867037978"/>
       </p:ext>
     </p:extLst>
   </p:cSld>
@@ -10219,15 +10103,13 @@
           <a:bodyPr/>
           <a:lstStyle/>
           <a:p>
+            <a:pPr marL="0" lvl="0" indent="0">
+              <a:buNone/>
+            </a:pPr>
             <a:r>
               <a:rPr lang="en-US" dirty="0"/>
-              <a:t>Use Meaningful</a:t>
-            </a:r>
-            <a:r>
-              <a:rPr lang="en-US" baseline="0" dirty="0"/>
-              <a:t> Names</a:t>
-            </a:r>
-            <a:endParaRPr lang="en-US" dirty="0"/>
+              <a:t>Sort of Apology</a:t>
+            </a:r>
           </a:p>
         </p:txBody>
       </p:sp>
@@ -10244,7 +10126,7 @@
         <p:spPr/>
         <p:txBody>
           <a:bodyPr>
-            <a:normAutofit/>
+            <a:normAutofit fontScale="92500" lnSpcReduction="10000"/>
           </a:bodyPr>
           <a:lstStyle/>
           <a:p>
@@ -10259,7 +10141,7 @@
                 <a:ea typeface="+mn-ea"/>
                 <a:cs typeface="+mn-cs"/>
               </a:rPr>
-              <a:t>The type of the data should be obvious</a:t>
+              <a:t>Not PEP-8, sorry </a:t>
             </a:r>
           </a:p>
           <a:p>
@@ -10274,13 +10156,13 @@
                 <a:ea typeface="+mn-ea"/>
                 <a:cs typeface="+mn-cs"/>
               </a:rPr>
-              <a:t>It prevents a lot of runtime errors</a:t>
-            </a:r>
-          </a:p>
-          <a:p>
-            <a:pPr lvl="0"/>
-            <a:r>
-              <a:rPr lang="en-US" sz="3200" kern="1200" dirty="0">
+              <a:t>But you can embed type in a pep8 name, too </a:t>
+            </a:r>
+          </a:p>
+          <a:p>
+            <a:pPr lvl="2"/>
+            <a:r>
+              <a:rPr lang="en-US" sz="2400" kern="1200" dirty="0" err="1">
                 <a:solidFill>
                   <a:schemeClr val="tx1"/>
                 </a:solidFill>
@@ -10289,13 +10171,10 @@
                 <a:ea typeface="+mn-ea"/>
                 <a:cs typeface="+mn-cs"/>
               </a:rPr>
-              <a:t>I use "Hungarian naming" because (dinosaur!) I grew up with it</a:t>
-            </a:r>
-          </a:p>
-          <a:p>
-            <a:pPr lvl="1"/>
-            <a:r>
-              <a:rPr lang="en-US" sz="2800" kern="1200" dirty="0" err="1">
+              <a:t>foo_list</a:t>
+            </a:r>
+            <a:r>
+              <a:rPr lang="en-US" sz="2400" kern="1200" dirty="0">
                 <a:solidFill>
                   <a:schemeClr val="tx1"/>
                 </a:solidFill>
@@ -10304,10 +10183,10 @@
                 <a:ea typeface="+mn-ea"/>
                 <a:cs typeface="+mn-cs"/>
               </a:rPr>
-              <a:t>CamelCase</a:t>
-            </a:r>
-            <a:r>
-              <a:rPr lang="en-US" sz="2800" kern="1200" dirty="0">
+              <a:t> or </a:t>
+            </a:r>
+            <a:r>
+              <a:rPr lang="en-US" sz="2400" kern="1200" dirty="0" err="1">
                 <a:solidFill>
                   <a:schemeClr val="tx1"/>
                 </a:solidFill>
@@ -10316,13 +10195,14 @@
                 <a:ea typeface="+mn-ea"/>
                 <a:cs typeface="+mn-cs"/>
               </a:rPr>
-              <a:t> with ugly prefixes for datatypes </a:t>
-            </a:r>
-          </a:p>
-          <a:p>
-            <a:pPr lvl="1"/>
-            <a:r>
-              <a:rPr lang="en-US" sz="2800" kern="1200" dirty="0" err="1">
+              <a:t>list_foo</a:t>
+            </a:r>
+            <a:endParaRPr lang="en-US" dirty="0"/>
+          </a:p>
+          <a:p>
+            <a:pPr lvl="0"/>
+            <a:r>
+              <a:rPr lang="en-US" sz="3200" kern="1200" dirty="0">
                 <a:solidFill>
                   <a:schemeClr val="tx1"/>
                 </a:solidFill>
@@ -10331,10 +10211,10 @@
                 <a:ea typeface="+mn-ea"/>
                 <a:cs typeface="+mn-cs"/>
               </a:rPr>
-              <a:t>CamelCase</a:t>
-            </a:r>
-            <a:r>
-              <a:rPr lang="en-US" sz="2800" kern="1200" dirty="0">
+              <a:t>If I were building packages for distribution, I</a:t>
+            </a:r>
+            <a:r>
+              <a:rPr lang="en-US" sz="3200" kern="1200" baseline="0" dirty="0">
                 <a:solidFill>
                   <a:schemeClr val="tx1"/>
                 </a:solidFill>
@@ -10343,13 +10223,10 @@
                 <a:ea typeface="+mn-ea"/>
                 <a:cs typeface="+mn-cs"/>
               </a:rPr>
-              <a:t> is just a personal preference BUT</a:t>
-            </a:r>
-          </a:p>
-          <a:p>
-            <a:pPr lvl="1"/>
-            <a:r>
-              <a:rPr lang="en-US" sz="2800" kern="1200" dirty="0">
+              <a:t> would</a:t>
+            </a:r>
+            <a:r>
+              <a:rPr lang="en-US" sz="3200" kern="1200" dirty="0">
                 <a:solidFill>
                   <a:schemeClr val="tx1"/>
                 </a:solidFill>
@@ -10358,8 +10235,57 @@
                 <a:ea typeface="+mn-ea"/>
                 <a:cs typeface="+mn-cs"/>
               </a:rPr>
-              <a:t>Datatype at the beginning of the name of data (or a function) is useful</a:t>
-            </a:r>
+              <a:t> reform my evil ways</a:t>
+            </a:r>
+          </a:p>
+          <a:p>
+            <a:pPr lvl="0"/>
+            <a:endParaRPr lang="en-US" sz="3200" kern="1200" dirty="0">
+              <a:solidFill>
+                <a:schemeClr val="tx1"/>
+              </a:solidFill>
+              <a:effectLst/>
+              <a:latin typeface="+mn-lt"/>
+              <a:ea typeface="+mn-ea"/>
+              <a:cs typeface="+mn-cs"/>
+            </a:endParaRPr>
+          </a:p>
+          <a:p>
+            <a:pPr marL="0" indent="0">
+              <a:buNone/>
+            </a:pPr>
+            <a:r>
+              <a:rPr lang="en-US" sz="2200" dirty="0"/>
+              <a:t>"Any programmer who fails to comply with the standard</a:t>
+            </a:r>
+            <a:r>
+              <a:rPr lang="en-US" sz="2200" baseline="0" dirty="0"/>
+              <a:t> naming, formatting or commenting conventions should be shot.  If it so happens that it is inconvenient to shoot him, then he is to be politely requested to recode his program in adherence to the above standard."</a:t>
+            </a:r>
+          </a:p>
+          <a:p>
+            <a:pPr marL="0" indent="0">
+              <a:buNone/>
+            </a:pPr>
+            <a:endParaRPr lang="en-US" sz="2600" baseline="0" dirty="0"/>
+          </a:p>
+          <a:p>
+            <a:pPr marL="0" indent="0" algn="r">
+              <a:buNone/>
+            </a:pPr>
+            <a:r>
+              <a:rPr lang="en-US" sz="1900" i="1" baseline="0" dirty="0"/>
+              <a:t>-- Mike </a:t>
+            </a:r>
+            <a:r>
+              <a:rPr lang="en-US" sz="1900" i="1" baseline="0" dirty="0" err="1"/>
+              <a:t>Spier</a:t>
+            </a:r>
+            <a:r>
+              <a:rPr lang="en-US" sz="1900" i="1" baseline="0" dirty="0"/>
+              <a:t>, Digital Equipment Corporation, 1971</a:t>
+            </a:r>
+            <a:endParaRPr lang="en-US" sz="1900" i="1" dirty="0"/>
           </a:p>
         </p:txBody>
       </p:sp>
@@ -10434,7 +10360,7 @@
     </p:spTree>
     <p:extLst>
       <p:ext uri="{BB962C8B-B14F-4D97-AF65-F5344CB8AC3E}">
-        <p14:creationId xmlns:p14="http://schemas.microsoft.com/office/powerpoint/2010/main" val="867037978"/>
+        <p14:creationId xmlns:p14="http://schemas.microsoft.com/office/powerpoint/2010/main" val="1853156086"/>
       </p:ext>
     </p:extLst>
   </p:cSld>
@@ -10476,12 +10402,9 @@
           <a:bodyPr/>
           <a:lstStyle/>
           <a:p>
-            <a:pPr marL="0" lvl="0" indent="0">
-              <a:buNone/>
-            </a:pPr>
             <a:r>
               <a:rPr lang="en-US" dirty="0"/>
-              <a:t>Sort of Apology</a:t>
+              <a:t>Meaningful Data Contents, Too</a:t>
             </a:r>
           </a:p>
         </p:txBody>
@@ -10499,7 +10422,7 @@
         <p:spPr/>
         <p:txBody>
           <a:bodyPr>
-            <a:normAutofit fontScale="92500" lnSpcReduction="10000"/>
+            <a:normAutofit/>
           </a:bodyPr>
           <a:lstStyle/>
           <a:p>
@@ -10514,7 +10437,7 @@
                 <a:ea typeface="+mn-ea"/>
                 <a:cs typeface="+mn-cs"/>
               </a:rPr>
-              <a:t>Not PEP-8, sorry </a:t>
+              <a:t>If you have lots of class instances, addresses are not useful to humans</a:t>
             </a:r>
           </a:p>
           <a:p>
@@ -10529,13 +10452,13 @@
                 <a:ea typeface="+mn-ea"/>
                 <a:cs typeface="+mn-cs"/>
               </a:rPr>
-              <a:t>But you can embed type in a pep8 name, too </a:t>
-            </a:r>
-          </a:p>
-          <a:p>
-            <a:pPr lvl="2"/>
-            <a:r>
-              <a:rPr lang="en-US" sz="2400" kern="1200" dirty="0" err="1">
+              <a:t>Assign readable IDs in instances</a:t>
+            </a:r>
+          </a:p>
+          <a:p>
+            <a:pPr lvl="0"/>
+            <a:r>
+              <a:rPr lang="en-US" sz="3200" kern="1200" dirty="0">
                 <a:solidFill>
                   <a:schemeClr val="tx1"/>
                 </a:solidFill>
@@ -10544,10 +10467,14 @@
                 <a:ea typeface="+mn-ea"/>
                 <a:cs typeface="+mn-cs"/>
               </a:rPr>
-              <a:t>foo_list</a:t>
-            </a:r>
-            <a:r>
-              <a:rPr lang="en-US" sz="2400" kern="1200" dirty="0">
+              <a:t>My last project had only </a:t>
+            </a:r>
+            <a:r>
+              <a:rPr lang="en-US" dirty="0"/>
+              <a:t>~2</a:t>
+            </a:r>
+            <a:r>
+              <a:rPr lang="en-US" sz="3200" kern="1200" dirty="0">
                 <a:solidFill>
                   <a:schemeClr val="tx1"/>
                 </a:solidFill>
@@ -10556,10 +10483,13 @@
                 <a:ea typeface="+mn-ea"/>
                 <a:cs typeface="+mn-cs"/>
               </a:rPr>
-              <a:t> or </a:t>
-            </a:r>
-            <a:r>
-              <a:rPr lang="en-US" sz="2400" kern="1200" dirty="0" err="1">
+              <a:t>0 major classes but 10-50,000 instances of some classes</a:t>
+            </a:r>
+          </a:p>
+          <a:p>
+            <a:pPr lvl="0"/>
+            <a:r>
+              <a:rPr lang="en-US" sz="3200" kern="1200" dirty="0">
                 <a:solidFill>
                   <a:schemeClr val="tx1"/>
                 </a:solidFill>
@@ -10568,14 +10498,10 @@
                 <a:ea typeface="+mn-ea"/>
                 <a:cs typeface="+mn-cs"/>
               </a:rPr>
-              <a:t>list_foo</a:t>
-            </a:r>
-            <a:endParaRPr lang="en-US" dirty="0"/>
-          </a:p>
-          <a:p>
-            <a:pPr lvl="0"/>
-            <a:r>
-              <a:rPr lang="en-US" sz="3200" kern="1200" dirty="0">
+              <a:t>(The debug</a:t>
+            </a:r>
+            <a:r>
+              <a:rPr lang="en-US" sz="3200" kern="1200" baseline="0" dirty="0">
                 <a:solidFill>
                   <a:schemeClr val="tx1"/>
                 </a:solidFill>
@@ -10584,35 +10510,8 @@
                 <a:ea typeface="+mn-ea"/>
                 <a:cs typeface="+mn-cs"/>
               </a:rPr>
-              <a:t>If I were building packages for distribution, I</a:t>
-            </a:r>
-            <a:r>
-              <a:rPr lang="en-US" sz="3200" kern="1200" baseline="0" dirty="0">
-                <a:solidFill>
-                  <a:schemeClr val="tx1"/>
-                </a:solidFill>
-                <a:effectLst/>
-                <a:latin typeface="+mn-lt"/>
-                <a:ea typeface="+mn-ea"/>
-                <a:cs typeface="+mn-cs"/>
-              </a:rPr>
-              <a:t> would</a:t>
-            </a:r>
-            <a:r>
-              <a:rPr lang="en-US" sz="3200" kern="1200" dirty="0">
-                <a:solidFill>
-                  <a:schemeClr val="tx1"/>
-                </a:solidFill>
-                <a:effectLst/>
-                <a:latin typeface="+mn-lt"/>
-                <a:ea typeface="+mn-ea"/>
-                <a:cs typeface="+mn-cs"/>
-              </a:rPr>
-              <a:t> reform my evil ways</a:t>
-            </a:r>
-          </a:p>
-          <a:p>
-            <a:pPr lvl="0"/>
+              <a:t> package here displays IDs, instance names)</a:t>
+            </a:r>
             <a:endParaRPr lang="en-US" sz="3200" kern="1200" dirty="0">
               <a:solidFill>
                 <a:schemeClr val="tx1"/>
@@ -10623,43 +10522,6 @@
               <a:cs typeface="+mn-cs"/>
             </a:endParaRPr>
           </a:p>
-          <a:p>
-            <a:pPr marL="0" indent="0">
-              <a:buNone/>
-            </a:pPr>
-            <a:r>
-              <a:rPr lang="en-US" sz="2200" dirty="0"/>
-              <a:t>"Any programmer who fails to comply with the standard</a:t>
-            </a:r>
-            <a:r>
-              <a:rPr lang="en-US" sz="2200" baseline="0" dirty="0"/>
-              <a:t> naming, formatting or commenting conventions should be shot.  If it so happens that it is inconvenient to shoot him, then he is to be politely requested to recode his program in adherence to the above standard."</a:t>
-            </a:r>
-          </a:p>
-          <a:p>
-            <a:pPr marL="0" indent="0">
-              <a:buNone/>
-            </a:pPr>
-            <a:endParaRPr lang="en-US" sz="2600" baseline="0" dirty="0"/>
-          </a:p>
-          <a:p>
-            <a:pPr marL="0" indent="0" algn="r">
-              <a:buNone/>
-            </a:pPr>
-            <a:r>
-              <a:rPr lang="en-US" sz="1900" i="1" baseline="0" dirty="0"/>
-              <a:t>-- Mike </a:t>
-            </a:r>
-            <a:r>
-              <a:rPr lang="en-US" sz="1900" i="1" baseline="0" dirty="0" err="1"/>
-              <a:t>Spier</a:t>
-            </a:r>
-            <a:r>
-              <a:rPr lang="en-US" sz="1900" i="1" baseline="0" dirty="0"/>
-              <a:t>, Digital Equipment Corporation, 1971</a:t>
-            </a:r>
-            <a:endParaRPr lang="en-US" sz="1900" i="1" dirty="0"/>
-          </a:p>
         </p:txBody>
       </p:sp>
       <p:sp>
@@ -10725,241 +10587,6 @@
             <a:fld id="{4E5DAAAA-9FFA-4439-92E3-68E3EA8B0D1F}" type="slidenum">
               <a:rPr lang="en-US" smtClean="0"/>
               <a:t>36</a:t>
-            </a:fld>
-            <a:endParaRPr lang="en-US" dirty="0"/>
-          </a:p>
-        </p:txBody>
-      </p:sp>
-    </p:spTree>
-    <p:extLst>
-      <p:ext uri="{BB962C8B-B14F-4D97-AF65-F5344CB8AC3E}">
-        <p14:creationId xmlns:p14="http://schemas.microsoft.com/office/powerpoint/2010/main" val="1853156086"/>
-      </p:ext>
-    </p:extLst>
-  </p:cSld>
-  <p:clrMapOvr>
-    <a:masterClrMapping/>
-  </p:clrMapOvr>
-</p:sld>
-</file>
-
-<file path=ppt/slides/slide37.xml><?xml version="1.0" encoding="utf-8"?>
-<p:sld xmlns:a="http://schemas.openxmlformats.org/drawingml/2006/main" xmlns:r="http://schemas.openxmlformats.org/officeDocument/2006/relationships" xmlns:p="http://schemas.openxmlformats.org/presentationml/2006/main">
-  <p:cSld>
-    <p:spTree>
-      <p:nvGrpSpPr>
-        <p:cNvPr id="1" name=""/>
-        <p:cNvGrpSpPr/>
-        <p:nvPr/>
-      </p:nvGrpSpPr>
-      <p:grpSpPr>
-        <a:xfrm>
-          <a:off x="0" y="0"/>
-          <a:ext cx="0" cy="0"/>
-          <a:chOff x="0" y="0"/>
-          <a:chExt cx="0" cy="0"/>
-        </a:xfrm>
-      </p:grpSpPr>
-      <p:sp>
-        <p:nvSpPr>
-          <p:cNvPr id="2" name="Title 1"/>
-          <p:cNvSpPr>
-            <a:spLocks noGrp="1"/>
-          </p:cNvSpPr>
-          <p:nvPr>
-            <p:ph type="title"/>
-          </p:nvPr>
-        </p:nvSpPr>
-        <p:spPr/>
-        <p:txBody>
-          <a:bodyPr/>
-          <a:lstStyle/>
-          <a:p>
-            <a:r>
-              <a:rPr lang="en-US" dirty="0"/>
-              <a:t>Meaningful Data Contents, Too</a:t>
-            </a:r>
-          </a:p>
-        </p:txBody>
-      </p:sp>
-      <p:sp>
-        <p:nvSpPr>
-          <p:cNvPr id="3" name="Content Placeholder 2"/>
-          <p:cNvSpPr>
-            <a:spLocks noGrp="1"/>
-          </p:cNvSpPr>
-          <p:nvPr>
-            <p:ph idx="1"/>
-          </p:nvPr>
-        </p:nvSpPr>
-        <p:spPr/>
-        <p:txBody>
-          <a:bodyPr>
-            <a:normAutofit/>
-          </a:bodyPr>
-          <a:lstStyle/>
-          <a:p>
-            <a:pPr lvl="0"/>
-            <a:r>
-              <a:rPr lang="en-US" sz="3200" kern="1200" dirty="0">
-                <a:solidFill>
-                  <a:schemeClr val="tx1"/>
-                </a:solidFill>
-                <a:effectLst/>
-                <a:latin typeface="+mn-lt"/>
-                <a:ea typeface="+mn-ea"/>
-                <a:cs typeface="+mn-cs"/>
-              </a:rPr>
-              <a:t>If you have lots of class instances, addresses are not useful to humans</a:t>
-            </a:r>
-          </a:p>
-          <a:p>
-            <a:pPr lvl="1"/>
-            <a:r>
-              <a:rPr lang="en-US" sz="2800" kern="1200" dirty="0">
-                <a:solidFill>
-                  <a:schemeClr val="tx1"/>
-                </a:solidFill>
-                <a:effectLst/>
-                <a:latin typeface="+mn-lt"/>
-                <a:ea typeface="+mn-ea"/>
-                <a:cs typeface="+mn-cs"/>
-              </a:rPr>
-              <a:t>Assign readable IDs in instances</a:t>
-            </a:r>
-          </a:p>
-          <a:p>
-            <a:pPr lvl="0"/>
-            <a:r>
-              <a:rPr lang="en-US" sz="3200" kern="1200" dirty="0">
-                <a:solidFill>
-                  <a:schemeClr val="tx1"/>
-                </a:solidFill>
-                <a:effectLst/>
-                <a:latin typeface="+mn-lt"/>
-                <a:ea typeface="+mn-ea"/>
-                <a:cs typeface="+mn-cs"/>
-              </a:rPr>
-              <a:t>My last project had only </a:t>
-            </a:r>
-            <a:r>
-              <a:rPr lang="en-US" dirty="0"/>
-              <a:t>~2</a:t>
-            </a:r>
-            <a:r>
-              <a:rPr lang="en-US" sz="3200" kern="1200" dirty="0">
-                <a:solidFill>
-                  <a:schemeClr val="tx1"/>
-                </a:solidFill>
-                <a:effectLst/>
-                <a:latin typeface="+mn-lt"/>
-                <a:ea typeface="+mn-ea"/>
-                <a:cs typeface="+mn-cs"/>
-              </a:rPr>
-              <a:t>0 major classes but 10-50,000 instances of some classes</a:t>
-            </a:r>
-          </a:p>
-          <a:p>
-            <a:pPr lvl="0"/>
-            <a:r>
-              <a:rPr lang="en-US" sz="3200" kern="1200" dirty="0">
-                <a:solidFill>
-                  <a:schemeClr val="tx1"/>
-                </a:solidFill>
-                <a:effectLst/>
-                <a:latin typeface="+mn-lt"/>
-                <a:ea typeface="+mn-ea"/>
-                <a:cs typeface="+mn-cs"/>
-              </a:rPr>
-              <a:t>(The debug</a:t>
-            </a:r>
-            <a:r>
-              <a:rPr lang="en-US" sz="3200" kern="1200" baseline="0" dirty="0">
-                <a:solidFill>
-                  <a:schemeClr val="tx1"/>
-                </a:solidFill>
-                <a:effectLst/>
-                <a:latin typeface="+mn-lt"/>
-                <a:ea typeface="+mn-ea"/>
-                <a:cs typeface="+mn-cs"/>
-              </a:rPr>
-              <a:t> package here displays IDs, instance names)</a:t>
-            </a:r>
-            <a:endParaRPr lang="en-US" sz="3200" kern="1200" dirty="0">
-              <a:solidFill>
-                <a:schemeClr val="tx1"/>
-              </a:solidFill>
-              <a:effectLst/>
-              <a:latin typeface="+mn-lt"/>
-              <a:ea typeface="+mn-ea"/>
-              <a:cs typeface="+mn-cs"/>
-            </a:endParaRPr>
-          </a:p>
-        </p:txBody>
-      </p:sp>
-      <p:sp>
-        <p:nvSpPr>
-          <p:cNvPr id="4" name="Date Placeholder 3"/>
-          <p:cNvSpPr>
-            <a:spLocks noGrp="1"/>
-          </p:cNvSpPr>
-          <p:nvPr>
-            <p:ph type="dt" sz="half" idx="10"/>
-          </p:nvPr>
-        </p:nvSpPr>
-        <p:spPr/>
-        <p:txBody>
-          <a:bodyPr/>
-          <a:lstStyle/>
-          <a:p>
-            <a:r>
-              <a:rPr lang="en-US"/>
-              <a:t>2021-01-22</a:t>
-            </a:r>
-          </a:p>
-        </p:txBody>
-      </p:sp>
-      <p:sp>
-        <p:nvSpPr>
-          <p:cNvPr id="5" name="Footer Placeholder 4"/>
-          <p:cNvSpPr>
-            <a:spLocks noGrp="1"/>
-          </p:cNvSpPr>
-          <p:nvPr>
-            <p:ph type="ftr" sz="quarter" idx="11"/>
-          </p:nvPr>
-        </p:nvSpPr>
-        <p:spPr/>
-        <p:txBody>
-          <a:bodyPr/>
-          <a:lstStyle/>
-          <a:p>
-            <a:r>
-              <a:rPr lang="en-US"/>
-              <a:t>RBL - Boston Python</a:t>
-            </a:r>
-            <a:endParaRPr lang="en-US" dirty="0"/>
-          </a:p>
-        </p:txBody>
-      </p:sp>
-      <p:sp>
-        <p:nvSpPr>
-          <p:cNvPr id="6" name="Slide Number Placeholder 5"/>
-          <p:cNvSpPr>
-            <a:spLocks noGrp="1"/>
-          </p:cNvSpPr>
-          <p:nvPr>
-            <p:ph type="sldNum" sz="quarter" idx="12"/>
-          </p:nvPr>
-        </p:nvSpPr>
-        <p:spPr/>
-        <p:txBody>
-          <a:bodyPr/>
-          <a:lstStyle/>
-          <a:p>
-            <a:fld id="{4E5DAAAA-9FFA-4439-92E3-68E3EA8B0D1F}" type="slidenum">
-              <a:rPr lang="en-US" smtClean="0"/>
-              <a:t>37</a:t>
             </a:fld>
             <a:endParaRPr lang="en-US" dirty="0"/>
           </a:p>

</xml_diff>